<commit_message>
update week 2 minichallenge instructions
</commit_message>
<xml_diff>
--- a/IntroToJS/IntroductionToJavaScript.pptx
+++ b/IntroToJS/IntroductionToJavaScript.pptx
@@ -5,7 +5,7 @@
     <p:sldMasterId id="2147483648" r:id="rId1"/>
   </p:sldMasterIdLst>
   <p:notesMasterIdLst>
-    <p:notesMasterId r:id="rId12"/>
+    <p:notesMasterId r:id="rId13"/>
   </p:notesMasterIdLst>
   <p:sldIdLst>
     <p:sldId id="258" r:id="rId2"/>
@@ -16,8 +16,9 @@
     <p:sldId id="311" r:id="rId7"/>
     <p:sldId id="312" r:id="rId8"/>
     <p:sldId id="313" r:id="rId9"/>
-    <p:sldId id="315" r:id="rId10"/>
-    <p:sldId id="314" r:id="rId11"/>
+    <p:sldId id="316" r:id="rId10"/>
+    <p:sldId id="315" r:id="rId11"/>
+    <p:sldId id="314" r:id="rId12"/>
   </p:sldIdLst>
   <p:sldSz cx="12192000" cy="6858000"/>
   <p:notesSz cx="6858000" cy="9144000"/>
@@ -217,7 +218,7 @@
           <a:p>
             <a:fld id="{19104133-B5B0-4351-8158-4F0E5EB1E2BF}" type="datetimeFigureOut">
               <a:rPr lang="en-US" smtClean="0"/>
-              <a:t>9/2/2022</a:t>
+              <a:t>2/26/2024</a:t>
             </a:fld>
             <a:endParaRPr lang="en-US"/>
           </a:p>
@@ -1196,7 +1197,7 @@
             <a:fld id="{1C2D31DE-C454-491C-B5C3-F097855E3DF7}" type="datetime4">
               <a:rPr lang="en-US" smtClean="0"/>
               <a:pPr/>
-              <a:t>September 2, 2022</a:t>
+              <a:t>February 26, 2024</a:t>
             </a:fld>
             <a:endParaRPr lang="en-US" dirty="0"/>
           </a:p>
@@ -4588,7 +4589,7 @@
           <a:p>
             <a:fld id="{5958763E-B898-436D-883D-03711491D54A}" type="datetimeFigureOut">
               <a:rPr lang="en-US" smtClean="0"/>
-              <a:t>9/2/2022</a:t>
+              <a:t>2/26/2024</a:t>
             </a:fld>
             <a:endParaRPr lang="en-US"/>
           </a:p>
@@ -4781,7 +4782,7 @@
           <a:p>
             <a:fld id="{5958763E-B898-436D-883D-03711491D54A}" type="datetimeFigureOut">
               <a:rPr lang="en-US" smtClean="0"/>
-              <a:t>9/2/2022</a:t>
+              <a:t>2/26/2024</a:t>
             </a:fld>
             <a:endParaRPr lang="en-US"/>
           </a:p>
@@ -5031,7 +5032,7 @@
           <a:p>
             <a:fld id="{5958763E-B898-436D-883D-03711491D54A}" type="datetimeFigureOut">
               <a:rPr lang="en-US" smtClean="0"/>
-              <a:t>9/2/2022</a:t>
+              <a:t>2/26/2024</a:t>
             </a:fld>
             <a:endParaRPr lang="en-US"/>
           </a:p>
@@ -5379,7 +5380,7 @@
           <a:p>
             <a:fld id="{5958763E-B898-436D-883D-03711491D54A}" type="datetimeFigureOut">
               <a:rPr lang="en-US" smtClean="0"/>
-              <a:t>9/2/2022</a:t>
+              <a:t>2/26/2024</a:t>
             </a:fld>
             <a:endParaRPr lang="en-US"/>
           </a:p>
@@ -5795,7 +5796,7 @@
           <a:p>
             <a:fld id="{5958763E-B898-436D-883D-03711491D54A}" type="datetimeFigureOut">
               <a:rPr lang="en-US" smtClean="0"/>
-              <a:t>9/2/2022</a:t>
+              <a:t>2/26/2024</a:t>
             </a:fld>
             <a:endParaRPr lang="en-US"/>
           </a:p>
@@ -6296,7 +6297,7 @@
           <a:p>
             <a:fld id="{5958763E-B898-436D-883D-03711491D54A}" type="datetimeFigureOut">
               <a:rPr lang="en-US" smtClean="0"/>
-              <a:t>9/2/2022</a:t>
+              <a:t>2/26/2024</a:t>
             </a:fld>
             <a:endParaRPr lang="en-US"/>
           </a:p>
@@ -6747,7 +6748,7 @@
           <a:p>
             <a:fld id="{5958763E-B898-436D-883D-03711491D54A}" type="datetimeFigureOut">
               <a:rPr lang="en-US" smtClean="0"/>
-              <a:t>9/2/2022</a:t>
+              <a:t>2/26/2024</a:t>
             </a:fld>
             <a:endParaRPr lang="en-US"/>
           </a:p>
@@ -7358,7 +7359,7 @@
           <a:p>
             <a:fld id="{5958763E-B898-436D-883D-03711491D54A}" type="datetimeFigureOut">
               <a:rPr lang="en-US" smtClean="0"/>
-              <a:t>9/2/2022</a:t>
+              <a:t>2/26/2024</a:t>
             </a:fld>
             <a:endParaRPr lang="en-US"/>
           </a:p>
@@ -8129,7 +8130,7 @@
           <a:p>
             <a:fld id="{5958763E-B898-436D-883D-03711491D54A}" type="datetimeFigureOut">
               <a:rPr lang="en-US" smtClean="0"/>
-              <a:t>9/2/2022</a:t>
+              <a:t>2/26/2024</a:t>
             </a:fld>
             <a:endParaRPr lang="en-US"/>
           </a:p>
@@ -8233,7 +8234,7 @@
           <a:p>
             <a:fld id="{5958763E-B898-436D-883D-03711491D54A}" type="datetimeFigureOut">
               <a:rPr lang="en-US" smtClean="0"/>
-              <a:t>9/2/2022</a:t>
+              <a:t>2/26/2024</a:t>
             </a:fld>
             <a:endParaRPr lang="en-US"/>
           </a:p>
@@ -8560,7 +8561,7 @@
             <a:fld id="{1C2D31DE-C454-491C-B5C3-F097855E3DF7}" type="datetime4">
               <a:rPr lang="en-US" smtClean="0"/>
               <a:pPr/>
-              <a:t>September 2, 2022</a:t>
+              <a:t>February 26, 2024</a:t>
             </a:fld>
             <a:endParaRPr lang="en-US" dirty="0"/>
           </a:p>
@@ -11712,7 +11713,7 @@
           <a:p>
             <a:fld id="{5958763E-B898-436D-883D-03711491D54A}" type="datetimeFigureOut">
               <a:rPr lang="en-US" smtClean="0"/>
-              <a:t>9/2/2022</a:t>
+              <a:t>2/26/2024</a:t>
             </a:fld>
             <a:endParaRPr lang="en-US"/>
           </a:p>
@@ -11836,7 +11837,7 @@
           <a:p>
             <a:fld id="{5958763E-B898-436D-883D-03711491D54A}" type="datetimeFigureOut">
               <a:rPr lang="en-US" smtClean="0"/>
-              <a:t>9/2/2022</a:t>
+              <a:t>2/26/2024</a:t>
             </a:fld>
             <a:endParaRPr lang="en-US"/>
           </a:p>
@@ -11960,7 +11961,7 @@
           <a:p>
             <a:fld id="{5958763E-B898-436D-883D-03711491D54A}" type="datetimeFigureOut">
               <a:rPr lang="en-US" smtClean="0"/>
-              <a:t>9/2/2022</a:t>
+              <a:t>2/26/2024</a:t>
             </a:fld>
             <a:endParaRPr lang="en-US"/>
           </a:p>
@@ -12084,7 +12085,7 @@
           <a:p>
             <a:fld id="{5958763E-B898-436D-883D-03711491D54A}" type="datetimeFigureOut">
               <a:rPr lang="en-US" smtClean="0"/>
-              <a:t>9/2/2022</a:t>
+              <a:t>2/26/2024</a:t>
             </a:fld>
             <a:endParaRPr lang="en-US"/>
           </a:p>
@@ -12208,7 +12209,7 @@
           <a:p>
             <a:fld id="{5958763E-B898-436D-883D-03711491D54A}" type="datetimeFigureOut">
               <a:rPr lang="en-US" smtClean="0"/>
-              <a:t>9/2/2022</a:t>
+              <a:t>2/26/2024</a:t>
             </a:fld>
             <a:endParaRPr lang="en-US"/>
           </a:p>
@@ -12332,7 +12333,7 @@
           <a:p>
             <a:fld id="{5958763E-B898-436D-883D-03711491D54A}" type="datetimeFigureOut">
               <a:rPr lang="en-US" smtClean="0"/>
-              <a:t>9/2/2022</a:t>
+              <a:t>2/26/2024</a:t>
             </a:fld>
             <a:endParaRPr lang="en-US"/>
           </a:p>
@@ -12456,7 +12457,7 @@
           <a:p>
             <a:fld id="{5958763E-B898-436D-883D-03711491D54A}" type="datetimeFigureOut">
               <a:rPr lang="en-US" smtClean="0"/>
-              <a:t>9/2/2022</a:t>
+              <a:t>2/26/2024</a:t>
             </a:fld>
             <a:endParaRPr lang="en-US"/>
           </a:p>
@@ -12580,7 +12581,7 @@
           <a:p>
             <a:fld id="{5958763E-B898-436D-883D-03711491D54A}" type="datetimeFigureOut">
               <a:rPr lang="en-US" smtClean="0"/>
-              <a:t>9/2/2022</a:t>
+              <a:t>2/26/2024</a:t>
             </a:fld>
             <a:endParaRPr lang="en-US"/>
           </a:p>
@@ -12713,7 +12714,7 @@
           <a:p>
             <a:fld id="{5958763E-B898-436D-883D-03711491D54A}" type="datetimeFigureOut">
               <a:rPr lang="en-US" smtClean="0"/>
-              <a:t>9/2/2022</a:t>
+              <a:t>2/26/2024</a:t>
             </a:fld>
             <a:endParaRPr lang="en-US"/>
           </a:p>
@@ -16052,7 +16053,7 @@
             <a:fld id="{1C2D31DE-C454-491C-B5C3-F097855E3DF7}" type="datetime4">
               <a:rPr lang="en-US" smtClean="0"/>
               <a:pPr/>
-              <a:t>September 2, 2022</a:t>
+              <a:t>February 26, 2024</a:t>
             </a:fld>
             <a:endParaRPr lang="en-US" dirty="0"/>
           </a:p>
@@ -28288,7 +28289,7 @@
           <a:p>
             <a:fld id="{5958763E-B898-436D-883D-03711491D54A}" type="datetimeFigureOut">
               <a:rPr lang="en-US" smtClean="0"/>
-              <a:t>9/2/2022</a:t>
+              <a:t>2/26/2024</a:t>
             </a:fld>
             <a:endParaRPr lang="en-US"/>
           </a:p>
@@ -28690,7 +28691,7 @@
           <a:p>
             <a:fld id="{5958763E-B898-436D-883D-03711491D54A}" type="datetimeFigureOut">
               <a:rPr lang="en-US" smtClean="0"/>
-              <a:t>9/2/2022</a:t>
+              <a:t>2/26/2024</a:t>
             </a:fld>
             <a:endParaRPr lang="en-US"/>
           </a:p>
@@ -28984,7 +28985,7 @@
           <a:p>
             <a:fld id="{5958763E-B898-436D-883D-03711491D54A}" type="datetimeFigureOut">
               <a:rPr lang="en-US" smtClean="0"/>
-              <a:t>9/2/2022</a:t>
+              <a:t>2/26/2024</a:t>
             </a:fld>
             <a:endParaRPr lang="en-US"/>
           </a:p>
@@ -29185,7 +29186,7 @@
           <a:p>
             <a:fld id="{5958763E-B898-436D-883D-03711491D54A}" type="datetimeFigureOut">
               <a:rPr lang="en-US" smtClean="0"/>
-              <a:t>9/2/2022</a:t>
+              <a:t>2/26/2024</a:t>
             </a:fld>
             <a:endParaRPr lang="en-US"/>
           </a:p>
@@ -29446,7 +29447,7 @@
           <a:p>
             <a:fld id="{5958763E-B898-436D-883D-03711491D54A}" type="datetimeFigureOut">
               <a:rPr lang="en-US" smtClean="0"/>
-              <a:t>9/2/2022</a:t>
+              <a:t>2/26/2024</a:t>
             </a:fld>
             <a:endParaRPr lang="en-US"/>
           </a:p>
@@ -29954,7 +29955,7 @@
           <a:p>
             <a:fld id="{5958763E-B898-436D-883D-03711491D54A}" type="datetimeFigureOut">
               <a:rPr lang="en-US" smtClean="0"/>
-              <a:t>9/2/2022</a:t>
+              <a:t>2/26/2024</a:t>
             </a:fld>
             <a:endParaRPr lang="en-US"/>
           </a:p>
@@ -30433,7 +30434,7 @@
           <a:p>
             <a:fld id="{5958763E-B898-436D-883D-03711491D54A}" type="datetimeFigureOut">
               <a:rPr lang="en-US" smtClean="0"/>
-              <a:t>9/2/2022</a:t>
+              <a:t>2/26/2024</a:t>
             </a:fld>
             <a:endParaRPr lang="en-US"/>
           </a:p>
@@ -31252,7 +31253,7 @@
           <a:p>
             <a:fld id="{5958763E-B898-436D-883D-03711491D54A}" type="datetimeFigureOut">
               <a:rPr lang="en-US" smtClean="0"/>
-              <a:t>9/2/2022</a:t>
+              <a:t>2/26/2024</a:t>
             </a:fld>
             <a:endParaRPr lang="en-US"/>
           </a:p>
@@ -31453,7 +31454,7 @@
           <a:p>
             <a:fld id="{5958763E-B898-436D-883D-03711491D54A}" type="datetimeFigureOut">
               <a:rPr lang="en-US" smtClean="0"/>
-              <a:t>9/2/2022</a:t>
+              <a:t>2/26/2024</a:t>
             </a:fld>
             <a:endParaRPr lang="en-US"/>
           </a:p>
@@ -31788,7 +31789,7 @@
           <a:p>
             <a:fld id="{5958763E-B898-436D-883D-03711491D54A}" type="datetimeFigureOut">
               <a:rPr lang="en-US" smtClean="0"/>
-              <a:t>9/2/2022</a:t>
+              <a:t>2/26/2024</a:t>
             </a:fld>
             <a:endParaRPr lang="en-US"/>
           </a:p>
@@ -32018,7 +32019,7 @@
           <a:p>
             <a:fld id="{5958763E-B898-436D-883D-03711491D54A}" type="datetimeFigureOut">
               <a:rPr lang="en-US" smtClean="0"/>
-              <a:t>9/2/2022</a:t>
+              <a:t>2/26/2024</a:t>
             </a:fld>
             <a:endParaRPr lang="en-US"/>
           </a:p>
@@ -32262,7 +32263,7 @@
           <a:p>
             <a:fld id="{5958763E-B898-436D-883D-03711491D54A}" type="datetimeFigureOut">
               <a:rPr lang="en-US" smtClean="0"/>
-              <a:t>9/2/2022</a:t>
+              <a:t>2/26/2024</a:t>
             </a:fld>
             <a:endParaRPr lang="en-US"/>
           </a:p>
@@ -35809,6 +35810,128 @@
 </file>
 
 <file path=ppt/slides/slide10.xml><?xml version="1.0" encoding="utf-8"?>
+<p:sld xmlns:a="http://schemas.openxmlformats.org/drawingml/2006/main" xmlns:r="http://schemas.openxmlformats.org/officeDocument/2006/relationships" xmlns:p="http://schemas.openxmlformats.org/presentationml/2006/main">
+  <p:cSld>
+    <p:spTree>
+      <p:nvGrpSpPr>
+        <p:cNvPr id="1" name=""/>
+        <p:cNvGrpSpPr/>
+        <p:nvPr/>
+      </p:nvGrpSpPr>
+      <p:grpSpPr>
+        <a:xfrm>
+          <a:off x="0" y="0"/>
+          <a:ext cx="0" cy="0"/>
+          <a:chOff x="0" y="0"/>
+          <a:chExt cx="0" cy="0"/>
+        </a:xfrm>
+      </p:grpSpPr>
+      <p:sp>
+        <p:nvSpPr>
+          <p:cNvPr id="2" name="Title 1">
+            <a:extLst>
+              <a:ext uri="{FF2B5EF4-FFF2-40B4-BE49-F238E27FC236}">
+                <a16:creationId xmlns:a16="http://schemas.microsoft.com/office/drawing/2014/main" id="{1AAE2480-6EC5-4F82-A8AF-E7F04F14C1DC}"/>
+              </a:ext>
+            </a:extLst>
+          </p:cNvPr>
+          <p:cNvSpPr>
+            <a:spLocks noGrp="1"/>
+          </p:cNvSpPr>
+          <p:nvPr>
+            <p:ph type="title"/>
+          </p:nvPr>
+        </p:nvSpPr>
+        <p:spPr/>
+        <p:txBody>
+          <a:bodyPr/>
+          <a:lstStyle/>
+          <a:p>
+            <a:r>
+              <a:rPr lang="en-US" dirty="0"/>
+              <a:t>Hello, Drake!</a:t>
+            </a:r>
+          </a:p>
+        </p:txBody>
+      </p:sp>
+      <p:sp>
+        <p:nvSpPr>
+          <p:cNvPr id="5" name="TextBox 4">
+            <a:extLst>
+              <a:ext uri="{FF2B5EF4-FFF2-40B4-BE49-F238E27FC236}">
+                <a16:creationId xmlns:a16="http://schemas.microsoft.com/office/drawing/2014/main" id="{57951CC6-2030-45B1-873D-920D27F40FFC}"/>
+              </a:ext>
+            </a:extLst>
+          </p:cNvPr>
+          <p:cNvSpPr txBox="1"/>
+          <p:nvPr/>
+        </p:nvSpPr>
+        <p:spPr>
+          <a:xfrm>
+            <a:off x="391668" y="2875002"/>
+            <a:ext cx="11430000" cy="1107996"/>
+          </a:xfrm>
+          <a:prstGeom prst="rect">
+            <a:avLst/>
+          </a:prstGeom>
+          <a:noFill/>
+        </p:spPr>
+        <p:txBody>
+          <a:bodyPr wrap="square">
+            <a:spAutoFit/>
+          </a:bodyPr>
+          <a:lstStyle/>
+          <a:p>
+            <a:pPr marL="0" indent="0" algn="ctr">
+              <a:buNone/>
+            </a:pPr>
+            <a:r>
+              <a:rPr lang="en-US" sz="6600" dirty="0">
+                <a:solidFill>
+                  <a:srgbClr val="000000"/>
+                </a:solidFill>
+                <a:latin typeface="Consolas" panose="020B0609020204030204" pitchFamily="49" charset="0"/>
+              </a:rPr>
+              <a:t>alert(</a:t>
+            </a:r>
+            <a:r>
+              <a:rPr lang="en-US" sz="6600" dirty="0">
+                <a:solidFill>
+                  <a:srgbClr val="A31515"/>
+                </a:solidFill>
+                <a:latin typeface="Consolas" panose="020B0609020204030204" pitchFamily="49" charset="0"/>
+              </a:rPr>
+              <a:t>"Hello, Drake!"</a:t>
+            </a:r>
+            <a:r>
+              <a:rPr lang="en-US" sz="6600" dirty="0">
+                <a:solidFill>
+                  <a:srgbClr val="000000"/>
+                </a:solidFill>
+                <a:latin typeface="Consolas" panose="020B0609020204030204" pitchFamily="49" charset="0"/>
+              </a:rPr>
+              <a:t>);</a:t>
+            </a:r>
+          </a:p>
+        </p:txBody>
+      </p:sp>
+    </p:spTree>
+    <p:extLst>
+      <p:ext uri="{BB962C8B-B14F-4D97-AF65-F5344CB8AC3E}">
+        <p14:creationId xmlns:p14="http://schemas.microsoft.com/office/powerpoint/2010/main" val="3270118950"/>
+      </p:ext>
+    </p:extLst>
+  </p:cSld>
+  <p:clrMapOvr>
+    <a:masterClrMapping/>
+  </p:clrMapOvr>
+  <p:transition>
+    <p:fade/>
+  </p:transition>
+</p:sld>
+</file>
+
+<file path=ppt/slides/slide11.xml><?xml version="1.0" encoding="utf-8"?>
 <p:sld xmlns:a="http://schemas.openxmlformats.org/drawingml/2006/main" xmlns:r="http://schemas.openxmlformats.org/officeDocument/2006/relationships" xmlns:p="http://schemas.openxmlformats.org/presentationml/2006/main">
   <p:cSld>
     <p:spTree>
@@ -39297,6 +39420,761 @@
           <a:p>
             <a:r>
               <a:rPr lang="en-US" dirty="0"/>
+              <a:t>Mini-challenge: Setup</a:t>
+            </a:r>
+          </a:p>
+        </p:txBody>
+      </p:sp>
+      <p:sp>
+        <p:nvSpPr>
+          <p:cNvPr id="3" name="Content Placeholder 2"/>
+          <p:cNvSpPr>
+            <a:spLocks noGrp="1"/>
+          </p:cNvSpPr>
+          <p:nvPr>
+            <p:ph idx="1"/>
+          </p:nvPr>
+        </p:nvSpPr>
+        <p:spPr>
+          <a:xfrm>
+            <a:off x="381000" y="1143000"/>
+            <a:ext cx="11430000" cy="3886200"/>
+          </a:xfrm>
+        </p:spPr>
+        <p:txBody>
+          <a:bodyPr anchor="ctr">
+            <a:normAutofit/>
+          </a:bodyPr>
+          <a:lstStyle/>
+          <a:p>
+            <a:pPr marL="800100" indent="-742950">
+              <a:buFont typeface="+mj-lt"/>
+              <a:buAutoNum type="arabicPeriod"/>
+            </a:pPr>
+            <a:r>
+              <a:rPr lang="en-US" sz="3200" dirty="0"/>
+              <a:t>Go to </a:t>
+            </a:r>
+            <a:r>
+              <a:rPr lang="en-US" sz="3200" b="1" u="sng" dirty="0">
+                <a:solidFill>
+                  <a:schemeClr val="accent1">
+                    <a:lumMod val="75000"/>
+                  </a:schemeClr>
+                </a:solidFill>
+              </a:rPr>
+              <a:t>replit.com</a:t>
+            </a:r>
+          </a:p>
+          <a:p>
+            <a:pPr marL="1143000" lvl="1" indent="-742950">
+              <a:buFont typeface="+mj-lt"/>
+              <a:buAutoNum type="arabicPeriod"/>
+            </a:pPr>
+            <a:r>
+              <a:rPr lang="en-US" sz="2800" dirty="0"/>
+              <a:t>Make sure you’re logged in</a:t>
+            </a:r>
+          </a:p>
+          <a:p>
+            <a:pPr marL="800100" indent="-742950">
+              <a:buFont typeface="+mj-lt"/>
+              <a:buAutoNum type="arabicPeriod"/>
+            </a:pPr>
+            <a:r>
+              <a:rPr lang="en-US" sz="3200" dirty="0"/>
+              <a:t>Click </a:t>
+            </a:r>
+            <a:r>
+              <a:rPr lang="en-US" sz="3200" b="1" dirty="0"/>
+              <a:t>+ Create Repl</a:t>
+            </a:r>
+            <a:endParaRPr lang="en-US" sz="3200" dirty="0"/>
+          </a:p>
+          <a:p>
+            <a:pPr marL="800100" indent="-742950">
+              <a:buFont typeface="+mj-lt"/>
+              <a:buAutoNum type="arabicPeriod"/>
+            </a:pPr>
+            <a:r>
+              <a:rPr lang="en-US" sz="3200" dirty="0"/>
+              <a:t>Select HTML, CSS, JS</a:t>
+            </a:r>
+          </a:p>
+          <a:p>
+            <a:pPr marL="800100" indent="-742950">
+              <a:buFont typeface="+mj-lt"/>
+              <a:buAutoNum type="arabicPeriod"/>
+            </a:pPr>
+            <a:r>
+              <a:rPr lang="en-US" sz="3200" dirty="0"/>
+              <a:t>Click </a:t>
+            </a:r>
+            <a:r>
+              <a:rPr lang="en-US" sz="3200" b="1" dirty="0"/>
+              <a:t>+ Create Repl</a:t>
+            </a:r>
+          </a:p>
+          <a:p>
+            <a:pPr marL="800100" indent="-742950">
+              <a:buFont typeface="+mj-lt"/>
+              <a:buAutoNum type="arabicPeriod"/>
+            </a:pPr>
+            <a:r>
+              <a:rPr lang="en-US" sz="3200" dirty="0"/>
+              <a:t>Open the </a:t>
+            </a:r>
+            <a:r>
+              <a:rPr lang="en-US" sz="3200" b="1" dirty="0"/>
+              <a:t>script.js</a:t>
+            </a:r>
+            <a:r>
+              <a:rPr lang="en-US" sz="3200" dirty="0"/>
+              <a:t> file</a:t>
+            </a:r>
+          </a:p>
+        </p:txBody>
+      </p:sp>
+      <p:pic>
+        <p:nvPicPr>
+          <p:cNvPr id="5" name="Picture 4">
+            <a:extLst>
+              <a:ext uri="{FF2B5EF4-FFF2-40B4-BE49-F238E27FC236}">
+                <a16:creationId xmlns:a16="http://schemas.microsoft.com/office/drawing/2014/main" id="{9AC09E03-0056-BBED-F6A3-8EB64A51CFE7}"/>
+              </a:ext>
+            </a:extLst>
+          </p:cNvPr>
+          <p:cNvPicPr>
+            <a:picLocks noChangeAspect="1"/>
+          </p:cNvPicPr>
+          <p:nvPr/>
+        </p:nvPicPr>
+        <p:blipFill>
+          <a:blip r:embed="rId2"/>
+          <a:stretch>
+            <a:fillRect/>
+          </a:stretch>
+        </p:blipFill>
+        <p:spPr>
+          <a:xfrm>
+            <a:off x="6781800" y="1718938"/>
+            <a:ext cx="2305372" cy="609685"/>
+          </a:xfrm>
+          <a:prstGeom prst="rect">
+            <a:avLst/>
+          </a:prstGeom>
+        </p:spPr>
+      </p:pic>
+      <p:pic>
+        <p:nvPicPr>
+          <p:cNvPr id="7" name="Picture 6">
+            <a:extLst>
+              <a:ext uri="{FF2B5EF4-FFF2-40B4-BE49-F238E27FC236}">
+                <a16:creationId xmlns:a16="http://schemas.microsoft.com/office/drawing/2014/main" id="{EF8EE8CF-9D62-03A0-7235-4D7A86E33646}"/>
+              </a:ext>
+            </a:extLst>
+          </p:cNvPr>
+          <p:cNvPicPr>
+            <a:picLocks noChangeAspect="1"/>
+          </p:cNvPicPr>
+          <p:nvPr/>
+        </p:nvPicPr>
+        <p:blipFill rotWithShape="1">
+          <a:blip r:embed="rId3"/>
+          <a:srcRect l="2198"/>
+          <a:stretch/>
+        </p:blipFill>
+        <p:spPr>
+          <a:xfrm>
+            <a:off x="5753100" y="2580325"/>
+            <a:ext cx="5943600" cy="3898105"/>
+          </a:xfrm>
+          <a:prstGeom prst="rect">
+            <a:avLst/>
+          </a:prstGeom>
+        </p:spPr>
+      </p:pic>
+      <p:pic>
+        <p:nvPicPr>
+          <p:cNvPr id="9" name="Picture 8">
+            <a:extLst>
+              <a:ext uri="{FF2B5EF4-FFF2-40B4-BE49-F238E27FC236}">
+                <a16:creationId xmlns:a16="http://schemas.microsoft.com/office/drawing/2014/main" id="{6674B6F4-F6C0-1770-192D-C4999DFEE50F}"/>
+              </a:ext>
+            </a:extLst>
+          </p:cNvPr>
+          <p:cNvPicPr>
+            <a:picLocks noChangeAspect="1"/>
+          </p:cNvPicPr>
+          <p:nvPr/>
+        </p:nvPicPr>
+        <p:blipFill>
+          <a:blip r:embed="rId4"/>
+          <a:stretch>
+            <a:fillRect/>
+          </a:stretch>
+        </p:blipFill>
+        <p:spPr>
+          <a:xfrm>
+            <a:off x="1409700" y="5059509"/>
+            <a:ext cx="2781688" cy="1590897"/>
+          </a:xfrm>
+          <a:prstGeom prst="rect">
+            <a:avLst/>
+          </a:prstGeom>
+        </p:spPr>
+      </p:pic>
+    </p:spTree>
+    <p:extLst>
+      <p:ext uri="{BB962C8B-B14F-4D97-AF65-F5344CB8AC3E}">
+        <p14:creationId xmlns:p14="http://schemas.microsoft.com/office/powerpoint/2010/main" val="2725968873"/>
+      </p:ext>
+    </p:extLst>
+  </p:cSld>
+  <p:clrMapOvr>
+    <a:masterClrMapping/>
+  </p:clrMapOvr>
+  <p:transition>
+    <p:fade/>
+  </p:transition>
+  <p:timing>
+    <p:tnLst>
+      <p:par>
+        <p:cTn id="1" dur="indefinite" restart="never" nodeType="tmRoot">
+          <p:childTnLst>
+            <p:seq concurrent="1" nextAc="seek">
+              <p:cTn id="2" dur="indefinite" nodeType="mainSeq">
+                <p:childTnLst>
+                  <p:par>
+                    <p:cTn id="3" fill="hold">
+                      <p:stCondLst>
+                        <p:cond delay="indefinite"/>
+                      </p:stCondLst>
+                      <p:childTnLst>
+                        <p:par>
+                          <p:cTn id="4" fill="hold">
+                            <p:stCondLst>
+                              <p:cond delay="0"/>
+                            </p:stCondLst>
+                            <p:childTnLst>
+                              <p:par>
+                                <p:cTn id="5" presetID="10" presetClass="entr" presetSubtype="0" fill="hold" nodeType="clickEffect">
+                                  <p:stCondLst>
+                                    <p:cond delay="0"/>
+                                  </p:stCondLst>
+                                  <p:childTnLst>
+                                    <p:set>
+                                      <p:cBhvr>
+                                        <p:cTn id="6" dur="1" fill="hold">
+                                          <p:stCondLst>
+                                            <p:cond delay="0"/>
+                                          </p:stCondLst>
+                                        </p:cTn>
+                                        <p:tgtEl>
+                                          <p:spTgt spid="3">
+                                            <p:txEl>
+                                              <p:pRg st="0" end="0"/>
+                                            </p:txEl>
+                                          </p:spTgt>
+                                        </p:tgtEl>
+                                        <p:attrNameLst>
+                                          <p:attrName>style.visibility</p:attrName>
+                                        </p:attrNameLst>
+                                      </p:cBhvr>
+                                      <p:to>
+                                        <p:strVal val="visible"/>
+                                      </p:to>
+                                    </p:set>
+                                    <p:animEffect transition="in" filter="fade">
+                                      <p:cBhvr>
+                                        <p:cTn id="7" dur="500"/>
+                                        <p:tgtEl>
+                                          <p:spTgt spid="3">
+                                            <p:txEl>
+                                              <p:pRg st="0" end="0"/>
+                                            </p:txEl>
+                                          </p:spTgt>
+                                        </p:tgtEl>
+                                      </p:cBhvr>
+                                    </p:animEffect>
+                                  </p:childTnLst>
+                                </p:cTn>
+                              </p:par>
+                            </p:childTnLst>
+                          </p:cTn>
+                        </p:par>
+                      </p:childTnLst>
+                    </p:cTn>
+                  </p:par>
+                  <p:par>
+                    <p:cTn id="8" fill="hold">
+                      <p:stCondLst>
+                        <p:cond delay="indefinite"/>
+                      </p:stCondLst>
+                      <p:childTnLst>
+                        <p:par>
+                          <p:cTn id="9" fill="hold">
+                            <p:stCondLst>
+                              <p:cond delay="0"/>
+                            </p:stCondLst>
+                            <p:childTnLst>
+                              <p:par>
+                                <p:cTn id="10" presetID="10" presetClass="entr" presetSubtype="0" fill="hold" nodeType="clickEffect">
+                                  <p:stCondLst>
+                                    <p:cond delay="0"/>
+                                  </p:stCondLst>
+                                  <p:childTnLst>
+                                    <p:set>
+                                      <p:cBhvr>
+                                        <p:cTn id="11" dur="1" fill="hold">
+                                          <p:stCondLst>
+                                            <p:cond delay="0"/>
+                                          </p:stCondLst>
+                                        </p:cTn>
+                                        <p:tgtEl>
+                                          <p:spTgt spid="3">
+                                            <p:txEl>
+                                              <p:pRg st="1" end="1"/>
+                                            </p:txEl>
+                                          </p:spTgt>
+                                        </p:tgtEl>
+                                        <p:attrNameLst>
+                                          <p:attrName>style.visibility</p:attrName>
+                                        </p:attrNameLst>
+                                      </p:cBhvr>
+                                      <p:to>
+                                        <p:strVal val="visible"/>
+                                      </p:to>
+                                    </p:set>
+                                    <p:animEffect transition="in" filter="fade">
+                                      <p:cBhvr>
+                                        <p:cTn id="12" dur="500"/>
+                                        <p:tgtEl>
+                                          <p:spTgt spid="3">
+                                            <p:txEl>
+                                              <p:pRg st="1" end="1"/>
+                                            </p:txEl>
+                                          </p:spTgt>
+                                        </p:tgtEl>
+                                      </p:cBhvr>
+                                    </p:animEffect>
+                                  </p:childTnLst>
+                                </p:cTn>
+                              </p:par>
+                            </p:childTnLst>
+                          </p:cTn>
+                        </p:par>
+                      </p:childTnLst>
+                    </p:cTn>
+                  </p:par>
+                  <p:par>
+                    <p:cTn id="13" fill="hold">
+                      <p:stCondLst>
+                        <p:cond delay="indefinite"/>
+                      </p:stCondLst>
+                      <p:childTnLst>
+                        <p:par>
+                          <p:cTn id="14" fill="hold">
+                            <p:stCondLst>
+                              <p:cond delay="0"/>
+                            </p:stCondLst>
+                            <p:childTnLst>
+                              <p:par>
+                                <p:cTn id="15" presetID="10" presetClass="entr" presetSubtype="0" fill="hold" nodeType="clickEffect">
+                                  <p:stCondLst>
+                                    <p:cond delay="0"/>
+                                  </p:stCondLst>
+                                  <p:childTnLst>
+                                    <p:set>
+                                      <p:cBhvr>
+                                        <p:cTn id="16" dur="1" fill="hold">
+                                          <p:stCondLst>
+                                            <p:cond delay="0"/>
+                                          </p:stCondLst>
+                                        </p:cTn>
+                                        <p:tgtEl>
+                                          <p:spTgt spid="3">
+                                            <p:txEl>
+                                              <p:pRg st="2" end="2"/>
+                                            </p:txEl>
+                                          </p:spTgt>
+                                        </p:tgtEl>
+                                        <p:attrNameLst>
+                                          <p:attrName>style.visibility</p:attrName>
+                                        </p:attrNameLst>
+                                      </p:cBhvr>
+                                      <p:to>
+                                        <p:strVal val="visible"/>
+                                      </p:to>
+                                    </p:set>
+                                    <p:animEffect transition="in" filter="fade">
+                                      <p:cBhvr>
+                                        <p:cTn id="17" dur="500"/>
+                                        <p:tgtEl>
+                                          <p:spTgt spid="3">
+                                            <p:txEl>
+                                              <p:pRg st="2" end="2"/>
+                                            </p:txEl>
+                                          </p:spTgt>
+                                        </p:tgtEl>
+                                      </p:cBhvr>
+                                    </p:animEffect>
+                                  </p:childTnLst>
+                                </p:cTn>
+                              </p:par>
+                              <p:par>
+                                <p:cTn id="18" presetID="10" presetClass="entr" presetSubtype="0" fill="hold" nodeType="withEffect">
+                                  <p:stCondLst>
+                                    <p:cond delay="0"/>
+                                  </p:stCondLst>
+                                  <p:childTnLst>
+                                    <p:set>
+                                      <p:cBhvr>
+                                        <p:cTn id="19" dur="1" fill="hold">
+                                          <p:stCondLst>
+                                            <p:cond delay="0"/>
+                                          </p:stCondLst>
+                                        </p:cTn>
+                                        <p:tgtEl>
+                                          <p:spTgt spid="5"/>
+                                        </p:tgtEl>
+                                        <p:attrNameLst>
+                                          <p:attrName>style.visibility</p:attrName>
+                                        </p:attrNameLst>
+                                      </p:cBhvr>
+                                      <p:to>
+                                        <p:strVal val="visible"/>
+                                      </p:to>
+                                    </p:set>
+                                    <p:animEffect transition="in" filter="fade">
+                                      <p:cBhvr>
+                                        <p:cTn id="20" dur="500"/>
+                                        <p:tgtEl>
+                                          <p:spTgt spid="5"/>
+                                        </p:tgtEl>
+                                      </p:cBhvr>
+                                    </p:animEffect>
+                                  </p:childTnLst>
+                                </p:cTn>
+                              </p:par>
+                            </p:childTnLst>
+                          </p:cTn>
+                        </p:par>
+                      </p:childTnLst>
+                    </p:cTn>
+                  </p:par>
+                  <p:par>
+                    <p:cTn id="21" fill="hold">
+                      <p:stCondLst>
+                        <p:cond delay="indefinite"/>
+                      </p:stCondLst>
+                      <p:childTnLst>
+                        <p:par>
+                          <p:cTn id="22" fill="hold">
+                            <p:stCondLst>
+                              <p:cond delay="0"/>
+                            </p:stCondLst>
+                            <p:childTnLst>
+                              <p:par>
+                                <p:cTn id="23" presetID="10" presetClass="entr" presetSubtype="0" fill="hold" nodeType="clickEffect">
+                                  <p:stCondLst>
+                                    <p:cond delay="0"/>
+                                  </p:stCondLst>
+                                  <p:childTnLst>
+                                    <p:set>
+                                      <p:cBhvr>
+                                        <p:cTn id="24" dur="1" fill="hold">
+                                          <p:stCondLst>
+                                            <p:cond delay="0"/>
+                                          </p:stCondLst>
+                                        </p:cTn>
+                                        <p:tgtEl>
+                                          <p:spTgt spid="3">
+                                            <p:txEl>
+                                              <p:pRg st="3" end="3"/>
+                                            </p:txEl>
+                                          </p:spTgt>
+                                        </p:tgtEl>
+                                        <p:attrNameLst>
+                                          <p:attrName>style.visibility</p:attrName>
+                                        </p:attrNameLst>
+                                      </p:cBhvr>
+                                      <p:to>
+                                        <p:strVal val="visible"/>
+                                      </p:to>
+                                    </p:set>
+                                    <p:animEffect transition="in" filter="fade">
+                                      <p:cBhvr>
+                                        <p:cTn id="25" dur="500"/>
+                                        <p:tgtEl>
+                                          <p:spTgt spid="3">
+                                            <p:txEl>
+                                              <p:pRg st="3" end="3"/>
+                                            </p:txEl>
+                                          </p:spTgt>
+                                        </p:tgtEl>
+                                      </p:cBhvr>
+                                    </p:animEffect>
+                                  </p:childTnLst>
+                                </p:cTn>
+                              </p:par>
+                            </p:childTnLst>
+                          </p:cTn>
+                        </p:par>
+                      </p:childTnLst>
+                    </p:cTn>
+                  </p:par>
+                  <p:par>
+                    <p:cTn id="26" fill="hold">
+                      <p:stCondLst>
+                        <p:cond delay="indefinite"/>
+                      </p:stCondLst>
+                      <p:childTnLst>
+                        <p:par>
+                          <p:cTn id="27" fill="hold">
+                            <p:stCondLst>
+                              <p:cond delay="0"/>
+                            </p:stCondLst>
+                            <p:childTnLst>
+                              <p:par>
+                                <p:cTn id="28" presetID="10" presetClass="entr" presetSubtype="0" fill="hold" nodeType="clickEffect">
+                                  <p:stCondLst>
+                                    <p:cond delay="0"/>
+                                  </p:stCondLst>
+                                  <p:childTnLst>
+                                    <p:set>
+                                      <p:cBhvr>
+                                        <p:cTn id="29" dur="1" fill="hold">
+                                          <p:stCondLst>
+                                            <p:cond delay="0"/>
+                                          </p:stCondLst>
+                                        </p:cTn>
+                                        <p:tgtEl>
+                                          <p:spTgt spid="3">
+                                            <p:txEl>
+                                              <p:pRg st="4" end="4"/>
+                                            </p:txEl>
+                                          </p:spTgt>
+                                        </p:tgtEl>
+                                        <p:attrNameLst>
+                                          <p:attrName>style.visibility</p:attrName>
+                                        </p:attrNameLst>
+                                      </p:cBhvr>
+                                      <p:to>
+                                        <p:strVal val="visible"/>
+                                      </p:to>
+                                    </p:set>
+                                    <p:animEffect transition="in" filter="fade">
+                                      <p:cBhvr>
+                                        <p:cTn id="30" dur="500"/>
+                                        <p:tgtEl>
+                                          <p:spTgt spid="3">
+                                            <p:txEl>
+                                              <p:pRg st="4" end="4"/>
+                                            </p:txEl>
+                                          </p:spTgt>
+                                        </p:tgtEl>
+                                      </p:cBhvr>
+                                    </p:animEffect>
+                                  </p:childTnLst>
+                                </p:cTn>
+                              </p:par>
+                              <p:par>
+                                <p:cTn id="31" presetID="10" presetClass="entr" presetSubtype="0" fill="hold" nodeType="withEffect">
+                                  <p:stCondLst>
+                                    <p:cond delay="0"/>
+                                  </p:stCondLst>
+                                  <p:childTnLst>
+                                    <p:set>
+                                      <p:cBhvr>
+                                        <p:cTn id="32" dur="1" fill="hold">
+                                          <p:stCondLst>
+                                            <p:cond delay="0"/>
+                                          </p:stCondLst>
+                                        </p:cTn>
+                                        <p:tgtEl>
+                                          <p:spTgt spid="7"/>
+                                        </p:tgtEl>
+                                        <p:attrNameLst>
+                                          <p:attrName>style.visibility</p:attrName>
+                                        </p:attrNameLst>
+                                      </p:cBhvr>
+                                      <p:to>
+                                        <p:strVal val="visible"/>
+                                      </p:to>
+                                    </p:set>
+                                    <p:animEffect transition="in" filter="fade">
+                                      <p:cBhvr>
+                                        <p:cTn id="33" dur="500"/>
+                                        <p:tgtEl>
+                                          <p:spTgt spid="7"/>
+                                        </p:tgtEl>
+                                      </p:cBhvr>
+                                    </p:animEffect>
+                                  </p:childTnLst>
+                                </p:cTn>
+                              </p:par>
+                            </p:childTnLst>
+                          </p:cTn>
+                        </p:par>
+                      </p:childTnLst>
+                    </p:cTn>
+                  </p:par>
+                  <p:par>
+                    <p:cTn id="34" fill="hold">
+                      <p:stCondLst>
+                        <p:cond delay="indefinite"/>
+                      </p:stCondLst>
+                      <p:childTnLst>
+                        <p:par>
+                          <p:cTn id="35" fill="hold">
+                            <p:stCondLst>
+                              <p:cond delay="0"/>
+                            </p:stCondLst>
+                            <p:childTnLst>
+                              <p:par>
+                                <p:cTn id="36" presetID="10" presetClass="entr" presetSubtype="0" fill="hold" nodeType="clickEffect">
+                                  <p:stCondLst>
+                                    <p:cond delay="0"/>
+                                  </p:stCondLst>
+                                  <p:childTnLst>
+                                    <p:set>
+                                      <p:cBhvr>
+                                        <p:cTn id="37" dur="1" fill="hold">
+                                          <p:stCondLst>
+                                            <p:cond delay="0"/>
+                                          </p:stCondLst>
+                                        </p:cTn>
+                                        <p:tgtEl>
+                                          <p:spTgt spid="3">
+                                            <p:txEl>
+                                              <p:pRg st="5" end="5"/>
+                                            </p:txEl>
+                                          </p:spTgt>
+                                        </p:tgtEl>
+                                        <p:attrNameLst>
+                                          <p:attrName>style.visibility</p:attrName>
+                                        </p:attrNameLst>
+                                      </p:cBhvr>
+                                      <p:to>
+                                        <p:strVal val="visible"/>
+                                      </p:to>
+                                    </p:set>
+                                    <p:animEffect transition="in" filter="fade">
+                                      <p:cBhvr>
+                                        <p:cTn id="38" dur="500"/>
+                                        <p:tgtEl>
+                                          <p:spTgt spid="3">
+                                            <p:txEl>
+                                              <p:pRg st="5" end="5"/>
+                                            </p:txEl>
+                                          </p:spTgt>
+                                        </p:tgtEl>
+                                      </p:cBhvr>
+                                    </p:animEffect>
+                                  </p:childTnLst>
+                                </p:cTn>
+                              </p:par>
+                              <p:par>
+                                <p:cTn id="39" presetID="10" presetClass="entr" presetSubtype="0" fill="hold" nodeType="withEffect">
+                                  <p:stCondLst>
+                                    <p:cond delay="0"/>
+                                  </p:stCondLst>
+                                  <p:childTnLst>
+                                    <p:set>
+                                      <p:cBhvr>
+                                        <p:cTn id="40" dur="1" fill="hold">
+                                          <p:stCondLst>
+                                            <p:cond delay="0"/>
+                                          </p:stCondLst>
+                                        </p:cTn>
+                                        <p:tgtEl>
+                                          <p:spTgt spid="9"/>
+                                        </p:tgtEl>
+                                        <p:attrNameLst>
+                                          <p:attrName>style.visibility</p:attrName>
+                                        </p:attrNameLst>
+                                      </p:cBhvr>
+                                      <p:to>
+                                        <p:strVal val="visible"/>
+                                      </p:to>
+                                    </p:set>
+                                    <p:animEffect transition="in" filter="fade">
+                                      <p:cBhvr>
+                                        <p:cTn id="41" dur="500"/>
+                                        <p:tgtEl>
+                                          <p:spTgt spid="9"/>
+                                        </p:tgtEl>
+                                      </p:cBhvr>
+                                    </p:animEffect>
+                                  </p:childTnLst>
+                                </p:cTn>
+                              </p:par>
+                            </p:childTnLst>
+                          </p:cTn>
+                        </p:par>
+                      </p:childTnLst>
+                    </p:cTn>
+                  </p:par>
+                </p:childTnLst>
+              </p:cTn>
+              <p:prevCondLst>
+                <p:cond evt="onPrev" delay="0">
+                  <p:tgtEl>
+                    <p:sldTgt/>
+                  </p:tgtEl>
+                </p:cond>
+              </p:prevCondLst>
+              <p:nextCondLst>
+                <p:cond evt="onNext" delay="0">
+                  <p:tgtEl>
+                    <p:sldTgt/>
+                  </p:tgtEl>
+                </p:cond>
+              </p:nextCondLst>
+            </p:seq>
+          </p:childTnLst>
+        </p:cTn>
+      </p:par>
+    </p:tnLst>
+  </p:timing>
+</p:sld>
+</file>
+
+<file path=ppt/slides/slide9.xml><?xml version="1.0" encoding="utf-8"?>
+<p:sld xmlns:a="http://schemas.openxmlformats.org/drawingml/2006/main" xmlns:r="http://schemas.openxmlformats.org/officeDocument/2006/relationships" xmlns:p="http://schemas.openxmlformats.org/presentationml/2006/main">
+  <p:cSld>
+    <p:spTree>
+      <p:nvGrpSpPr>
+        <p:cNvPr id="1" name=""/>
+        <p:cNvGrpSpPr/>
+        <p:nvPr/>
+      </p:nvGrpSpPr>
+      <p:grpSpPr>
+        <a:xfrm>
+          <a:off x="0" y="0"/>
+          <a:ext cx="0" cy="0"/>
+          <a:chOff x="0" y="0"/>
+          <a:chExt cx="0" cy="0"/>
+        </a:xfrm>
+      </p:grpSpPr>
+      <p:sp>
+        <p:nvSpPr>
+          <p:cNvPr id="2" name="Title 1"/>
+          <p:cNvSpPr>
+            <a:spLocks noGrp="1"/>
+          </p:cNvSpPr>
+          <p:nvPr>
+            <p:ph type="title"/>
+          </p:nvPr>
+        </p:nvSpPr>
+        <p:spPr/>
+        <p:txBody>
+          <a:bodyPr/>
+          <a:lstStyle/>
+          <a:p>
+            <a:r>
+              <a:rPr lang="en-US" dirty="0"/>
               <a:t>Mini-challenge</a:t>
             </a:r>
           </a:p>
@@ -39351,129 +40229,7 @@
     </p:spTree>
     <p:extLst>
       <p:ext uri="{BB962C8B-B14F-4D97-AF65-F5344CB8AC3E}">
-        <p14:creationId xmlns:p14="http://schemas.microsoft.com/office/powerpoint/2010/main" val="2725968873"/>
-      </p:ext>
-    </p:extLst>
-  </p:cSld>
-  <p:clrMapOvr>
-    <a:masterClrMapping/>
-  </p:clrMapOvr>
-  <p:transition>
-    <p:fade/>
-  </p:transition>
-</p:sld>
-</file>
-
-<file path=ppt/slides/slide9.xml><?xml version="1.0" encoding="utf-8"?>
-<p:sld xmlns:a="http://schemas.openxmlformats.org/drawingml/2006/main" xmlns:r="http://schemas.openxmlformats.org/officeDocument/2006/relationships" xmlns:p="http://schemas.openxmlformats.org/presentationml/2006/main">
-  <p:cSld>
-    <p:spTree>
-      <p:nvGrpSpPr>
-        <p:cNvPr id="1" name=""/>
-        <p:cNvGrpSpPr/>
-        <p:nvPr/>
-      </p:nvGrpSpPr>
-      <p:grpSpPr>
-        <a:xfrm>
-          <a:off x="0" y="0"/>
-          <a:ext cx="0" cy="0"/>
-          <a:chOff x="0" y="0"/>
-          <a:chExt cx="0" cy="0"/>
-        </a:xfrm>
-      </p:grpSpPr>
-      <p:sp>
-        <p:nvSpPr>
-          <p:cNvPr id="2" name="Title 1">
-            <a:extLst>
-              <a:ext uri="{FF2B5EF4-FFF2-40B4-BE49-F238E27FC236}">
-                <a16:creationId xmlns:a16="http://schemas.microsoft.com/office/drawing/2014/main" id="{1AAE2480-6EC5-4F82-A8AF-E7F04F14C1DC}"/>
-              </a:ext>
-            </a:extLst>
-          </p:cNvPr>
-          <p:cNvSpPr>
-            <a:spLocks noGrp="1"/>
-          </p:cNvSpPr>
-          <p:nvPr>
-            <p:ph type="title"/>
-          </p:nvPr>
-        </p:nvSpPr>
-        <p:spPr/>
-        <p:txBody>
-          <a:bodyPr/>
-          <a:lstStyle/>
-          <a:p>
-            <a:r>
-              <a:rPr lang="en-US" dirty="0"/>
-              <a:t>Hello, Drake!</a:t>
-            </a:r>
-          </a:p>
-        </p:txBody>
-      </p:sp>
-      <p:sp>
-        <p:nvSpPr>
-          <p:cNvPr id="5" name="TextBox 4">
-            <a:extLst>
-              <a:ext uri="{FF2B5EF4-FFF2-40B4-BE49-F238E27FC236}">
-                <a16:creationId xmlns:a16="http://schemas.microsoft.com/office/drawing/2014/main" id="{57951CC6-2030-45B1-873D-920D27F40FFC}"/>
-              </a:ext>
-            </a:extLst>
-          </p:cNvPr>
-          <p:cNvSpPr txBox="1"/>
-          <p:nvPr/>
-        </p:nvSpPr>
-        <p:spPr>
-          <a:xfrm>
-            <a:off x="391668" y="2875002"/>
-            <a:ext cx="11430000" cy="1107996"/>
-          </a:xfrm>
-          <a:prstGeom prst="rect">
-            <a:avLst/>
-          </a:prstGeom>
-          <a:noFill/>
-        </p:spPr>
-        <p:txBody>
-          <a:bodyPr wrap="square">
-            <a:spAutoFit/>
-          </a:bodyPr>
-          <a:lstStyle/>
-          <a:p>
-            <a:pPr marL="0" indent="0" algn="ctr">
-              <a:buNone/>
-            </a:pPr>
-            <a:r>
-              <a:rPr lang="en-US" sz="6600" dirty="0">
-                <a:solidFill>
-                  <a:srgbClr val="000000"/>
-                </a:solidFill>
-                <a:latin typeface="Consolas" panose="020B0609020204030204" pitchFamily="49" charset="0"/>
-              </a:rPr>
-              <a:t>alert(</a:t>
-            </a:r>
-            <a:r>
-              <a:rPr lang="en-US" sz="6600" dirty="0">
-                <a:solidFill>
-                  <a:srgbClr val="A31515"/>
-                </a:solidFill>
-                <a:latin typeface="Consolas" panose="020B0609020204030204" pitchFamily="49" charset="0"/>
-              </a:rPr>
-              <a:t>"Hello, Drake!"</a:t>
-            </a:r>
-            <a:r>
-              <a:rPr lang="en-US" sz="6600" dirty="0">
-                <a:solidFill>
-                  <a:srgbClr val="000000"/>
-                </a:solidFill>
-                <a:latin typeface="Consolas" panose="020B0609020204030204" pitchFamily="49" charset="0"/>
-              </a:rPr>
-              <a:t>);</a:t>
-            </a:r>
-          </a:p>
-        </p:txBody>
-      </p:sp>
-    </p:spTree>
-    <p:extLst>
-      <p:ext uri="{BB962C8B-B14F-4D97-AF65-F5344CB8AC3E}">
-        <p14:creationId xmlns:p14="http://schemas.microsoft.com/office/powerpoint/2010/main" val="3270118950"/>
+        <p14:creationId xmlns:p14="http://schemas.microsoft.com/office/powerpoint/2010/main" val="1164853227"/>
       </p:ext>
     </p:extLst>
   </p:cSld>

</xml_diff>

<commit_message>
Update gitbook 2024-02-26 16:07:24
</commit_message>
<xml_diff>
--- a/IntroToJS/IntroductionToJavaScript.pptx
+++ b/IntroToJS/IntroductionToJavaScript.pptx
@@ -5,7 +5,7 @@
     <p:sldMasterId id="2147483648" r:id="rId1"/>
   </p:sldMasterIdLst>
   <p:notesMasterIdLst>
-    <p:notesMasterId r:id="rId12"/>
+    <p:notesMasterId r:id="rId13"/>
   </p:notesMasterIdLst>
   <p:sldIdLst>
     <p:sldId id="258" r:id="rId2"/>
@@ -16,8 +16,9 @@
     <p:sldId id="311" r:id="rId7"/>
     <p:sldId id="312" r:id="rId8"/>
     <p:sldId id="313" r:id="rId9"/>
-    <p:sldId id="315" r:id="rId10"/>
-    <p:sldId id="314" r:id="rId11"/>
+    <p:sldId id="316" r:id="rId10"/>
+    <p:sldId id="315" r:id="rId11"/>
+    <p:sldId id="314" r:id="rId12"/>
   </p:sldIdLst>
   <p:sldSz cx="12192000" cy="6858000"/>
   <p:notesSz cx="6858000" cy="9144000"/>
@@ -217,7 +218,7 @@
           <a:p>
             <a:fld id="{19104133-B5B0-4351-8158-4F0E5EB1E2BF}" type="datetimeFigureOut">
               <a:rPr lang="en-US" smtClean="0"/>
-              <a:t>9/2/2022</a:t>
+              <a:t>2/26/2024</a:t>
             </a:fld>
             <a:endParaRPr lang="en-US"/>
           </a:p>
@@ -1196,7 +1197,7 @@
             <a:fld id="{1C2D31DE-C454-491C-B5C3-F097855E3DF7}" type="datetime4">
               <a:rPr lang="en-US" smtClean="0"/>
               <a:pPr/>
-              <a:t>September 2, 2022</a:t>
+              <a:t>February 26, 2024</a:t>
             </a:fld>
             <a:endParaRPr lang="en-US" dirty="0"/>
           </a:p>
@@ -4588,7 +4589,7 @@
           <a:p>
             <a:fld id="{5958763E-B898-436D-883D-03711491D54A}" type="datetimeFigureOut">
               <a:rPr lang="en-US" smtClean="0"/>
-              <a:t>9/2/2022</a:t>
+              <a:t>2/26/2024</a:t>
             </a:fld>
             <a:endParaRPr lang="en-US"/>
           </a:p>
@@ -4781,7 +4782,7 @@
           <a:p>
             <a:fld id="{5958763E-B898-436D-883D-03711491D54A}" type="datetimeFigureOut">
               <a:rPr lang="en-US" smtClean="0"/>
-              <a:t>9/2/2022</a:t>
+              <a:t>2/26/2024</a:t>
             </a:fld>
             <a:endParaRPr lang="en-US"/>
           </a:p>
@@ -5031,7 +5032,7 @@
           <a:p>
             <a:fld id="{5958763E-B898-436D-883D-03711491D54A}" type="datetimeFigureOut">
               <a:rPr lang="en-US" smtClean="0"/>
-              <a:t>9/2/2022</a:t>
+              <a:t>2/26/2024</a:t>
             </a:fld>
             <a:endParaRPr lang="en-US"/>
           </a:p>
@@ -5379,7 +5380,7 @@
           <a:p>
             <a:fld id="{5958763E-B898-436D-883D-03711491D54A}" type="datetimeFigureOut">
               <a:rPr lang="en-US" smtClean="0"/>
-              <a:t>9/2/2022</a:t>
+              <a:t>2/26/2024</a:t>
             </a:fld>
             <a:endParaRPr lang="en-US"/>
           </a:p>
@@ -5795,7 +5796,7 @@
           <a:p>
             <a:fld id="{5958763E-B898-436D-883D-03711491D54A}" type="datetimeFigureOut">
               <a:rPr lang="en-US" smtClean="0"/>
-              <a:t>9/2/2022</a:t>
+              <a:t>2/26/2024</a:t>
             </a:fld>
             <a:endParaRPr lang="en-US"/>
           </a:p>
@@ -6296,7 +6297,7 @@
           <a:p>
             <a:fld id="{5958763E-B898-436D-883D-03711491D54A}" type="datetimeFigureOut">
               <a:rPr lang="en-US" smtClean="0"/>
-              <a:t>9/2/2022</a:t>
+              <a:t>2/26/2024</a:t>
             </a:fld>
             <a:endParaRPr lang="en-US"/>
           </a:p>
@@ -6747,7 +6748,7 @@
           <a:p>
             <a:fld id="{5958763E-B898-436D-883D-03711491D54A}" type="datetimeFigureOut">
               <a:rPr lang="en-US" smtClean="0"/>
-              <a:t>9/2/2022</a:t>
+              <a:t>2/26/2024</a:t>
             </a:fld>
             <a:endParaRPr lang="en-US"/>
           </a:p>
@@ -7358,7 +7359,7 @@
           <a:p>
             <a:fld id="{5958763E-B898-436D-883D-03711491D54A}" type="datetimeFigureOut">
               <a:rPr lang="en-US" smtClean="0"/>
-              <a:t>9/2/2022</a:t>
+              <a:t>2/26/2024</a:t>
             </a:fld>
             <a:endParaRPr lang="en-US"/>
           </a:p>
@@ -8129,7 +8130,7 @@
           <a:p>
             <a:fld id="{5958763E-B898-436D-883D-03711491D54A}" type="datetimeFigureOut">
               <a:rPr lang="en-US" smtClean="0"/>
-              <a:t>9/2/2022</a:t>
+              <a:t>2/26/2024</a:t>
             </a:fld>
             <a:endParaRPr lang="en-US"/>
           </a:p>
@@ -8233,7 +8234,7 @@
           <a:p>
             <a:fld id="{5958763E-B898-436D-883D-03711491D54A}" type="datetimeFigureOut">
               <a:rPr lang="en-US" smtClean="0"/>
-              <a:t>9/2/2022</a:t>
+              <a:t>2/26/2024</a:t>
             </a:fld>
             <a:endParaRPr lang="en-US"/>
           </a:p>
@@ -8560,7 +8561,7 @@
             <a:fld id="{1C2D31DE-C454-491C-B5C3-F097855E3DF7}" type="datetime4">
               <a:rPr lang="en-US" smtClean="0"/>
               <a:pPr/>
-              <a:t>September 2, 2022</a:t>
+              <a:t>February 26, 2024</a:t>
             </a:fld>
             <a:endParaRPr lang="en-US" dirty="0"/>
           </a:p>
@@ -11712,7 +11713,7 @@
           <a:p>
             <a:fld id="{5958763E-B898-436D-883D-03711491D54A}" type="datetimeFigureOut">
               <a:rPr lang="en-US" smtClean="0"/>
-              <a:t>9/2/2022</a:t>
+              <a:t>2/26/2024</a:t>
             </a:fld>
             <a:endParaRPr lang="en-US"/>
           </a:p>
@@ -11836,7 +11837,7 @@
           <a:p>
             <a:fld id="{5958763E-B898-436D-883D-03711491D54A}" type="datetimeFigureOut">
               <a:rPr lang="en-US" smtClean="0"/>
-              <a:t>9/2/2022</a:t>
+              <a:t>2/26/2024</a:t>
             </a:fld>
             <a:endParaRPr lang="en-US"/>
           </a:p>
@@ -11960,7 +11961,7 @@
           <a:p>
             <a:fld id="{5958763E-B898-436D-883D-03711491D54A}" type="datetimeFigureOut">
               <a:rPr lang="en-US" smtClean="0"/>
-              <a:t>9/2/2022</a:t>
+              <a:t>2/26/2024</a:t>
             </a:fld>
             <a:endParaRPr lang="en-US"/>
           </a:p>
@@ -12084,7 +12085,7 @@
           <a:p>
             <a:fld id="{5958763E-B898-436D-883D-03711491D54A}" type="datetimeFigureOut">
               <a:rPr lang="en-US" smtClean="0"/>
-              <a:t>9/2/2022</a:t>
+              <a:t>2/26/2024</a:t>
             </a:fld>
             <a:endParaRPr lang="en-US"/>
           </a:p>
@@ -12208,7 +12209,7 @@
           <a:p>
             <a:fld id="{5958763E-B898-436D-883D-03711491D54A}" type="datetimeFigureOut">
               <a:rPr lang="en-US" smtClean="0"/>
-              <a:t>9/2/2022</a:t>
+              <a:t>2/26/2024</a:t>
             </a:fld>
             <a:endParaRPr lang="en-US"/>
           </a:p>
@@ -12332,7 +12333,7 @@
           <a:p>
             <a:fld id="{5958763E-B898-436D-883D-03711491D54A}" type="datetimeFigureOut">
               <a:rPr lang="en-US" smtClean="0"/>
-              <a:t>9/2/2022</a:t>
+              <a:t>2/26/2024</a:t>
             </a:fld>
             <a:endParaRPr lang="en-US"/>
           </a:p>
@@ -12456,7 +12457,7 @@
           <a:p>
             <a:fld id="{5958763E-B898-436D-883D-03711491D54A}" type="datetimeFigureOut">
               <a:rPr lang="en-US" smtClean="0"/>
-              <a:t>9/2/2022</a:t>
+              <a:t>2/26/2024</a:t>
             </a:fld>
             <a:endParaRPr lang="en-US"/>
           </a:p>
@@ -12580,7 +12581,7 @@
           <a:p>
             <a:fld id="{5958763E-B898-436D-883D-03711491D54A}" type="datetimeFigureOut">
               <a:rPr lang="en-US" smtClean="0"/>
-              <a:t>9/2/2022</a:t>
+              <a:t>2/26/2024</a:t>
             </a:fld>
             <a:endParaRPr lang="en-US"/>
           </a:p>
@@ -12713,7 +12714,7 @@
           <a:p>
             <a:fld id="{5958763E-B898-436D-883D-03711491D54A}" type="datetimeFigureOut">
               <a:rPr lang="en-US" smtClean="0"/>
-              <a:t>9/2/2022</a:t>
+              <a:t>2/26/2024</a:t>
             </a:fld>
             <a:endParaRPr lang="en-US"/>
           </a:p>
@@ -16052,7 +16053,7 @@
             <a:fld id="{1C2D31DE-C454-491C-B5C3-F097855E3DF7}" type="datetime4">
               <a:rPr lang="en-US" smtClean="0"/>
               <a:pPr/>
-              <a:t>September 2, 2022</a:t>
+              <a:t>February 26, 2024</a:t>
             </a:fld>
             <a:endParaRPr lang="en-US" dirty="0"/>
           </a:p>
@@ -28288,7 +28289,7 @@
           <a:p>
             <a:fld id="{5958763E-B898-436D-883D-03711491D54A}" type="datetimeFigureOut">
               <a:rPr lang="en-US" smtClean="0"/>
-              <a:t>9/2/2022</a:t>
+              <a:t>2/26/2024</a:t>
             </a:fld>
             <a:endParaRPr lang="en-US"/>
           </a:p>
@@ -28690,7 +28691,7 @@
           <a:p>
             <a:fld id="{5958763E-B898-436D-883D-03711491D54A}" type="datetimeFigureOut">
               <a:rPr lang="en-US" smtClean="0"/>
-              <a:t>9/2/2022</a:t>
+              <a:t>2/26/2024</a:t>
             </a:fld>
             <a:endParaRPr lang="en-US"/>
           </a:p>
@@ -28984,7 +28985,7 @@
           <a:p>
             <a:fld id="{5958763E-B898-436D-883D-03711491D54A}" type="datetimeFigureOut">
               <a:rPr lang="en-US" smtClean="0"/>
-              <a:t>9/2/2022</a:t>
+              <a:t>2/26/2024</a:t>
             </a:fld>
             <a:endParaRPr lang="en-US"/>
           </a:p>
@@ -29185,7 +29186,7 @@
           <a:p>
             <a:fld id="{5958763E-B898-436D-883D-03711491D54A}" type="datetimeFigureOut">
               <a:rPr lang="en-US" smtClean="0"/>
-              <a:t>9/2/2022</a:t>
+              <a:t>2/26/2024</a:t>
             </a:fld>
             <a:endParaRPr lang="en-US"/>
           </a:p>
@@ -29446,7 +29447,7 @@
           <a:p>
             <a:fld id="{5958763E-B898-436D-883D-03711491D54A}" type="datetimeFigureOut">
               <a:rPr lang="en-US" smtClean="0"/>
-              <a:t>9/2/2022</a:t>
+              <a:t>2/26/2024</a:t>
             </a:fld>
             <a:endParaRPr lang="en-US"/>
           </a:p>
@@ -29954,7 +29955,7 @@
           <a:p>
             <a:fld id="{5958763E-B898-436D-883D-03711491D54A}" type="datetimeFigureOut">
               <a:rPr lang="en-US" smtClean="0"/>
-              <a:t>9/2/2022</a:t>
+              <a:t>2/26/2024</a:t>
             </a:fld>
             <a:endParaRPr lang="en-US"/>
           </a:p>
@@ -30433,7 +30434,7 @@
           <a:p>
             <a:fld id="{5958763E-B898-436D-883D-03711491D54A}" type="datetimeFigureOut">
               <a:rPr lang="en-US" smtClean="0"/>
-              <a:t>9/2/2022</a:t>
+              <a:t>2/26/2024</a:t>
             </a:fld>
             <a:endParaRPr lang="en-US"/>
           </a:p>
@@ -31252,7 +31253,7 @@
           <a:p>
             <a:fld id="{5958763E-B898-436D-883D-03711491D54A}" type="datetimeFigureOut">
               <a:rPr lang="en-US" smtClean="0"/>
-              <a:t>9/2/2022</a:t>
+              <a:t>2/26/2024</a:t>
             </a:fld>
             <a:endParaRPr lang="en-US"/>
           </a:p>
@@ -31453,7 +31454,7 @@
           <a:p>
             <a:fld id="{5958763E-B898-436D-883D-03711491D54A}" type="datetimeFigureOut">
               <a:rPr lang="en-US" smtClean="0"/>
-              <a:t>9/2/2022</a:t>
+              <a:t>2/26/2024</a:t>
             </a:fld>
             <a:endParaRPr lang="en-US"/>
           </a:p>
@@ -31788,7 +31789,7 @@
           <a:p>
             <a:fld id="{5958763E-B898-436D-883D-03711491D54A}" type="datetimeFigureOut">
               <a:rPr lang="en-US" smtClean="0"/>
-              <a:t>9/2/2022</a:t>
+              <a:t>2/26/2024</a:t>
             </a:fld>
             <a:endParaRPr lang="en-US"/>
           </a:p>
@@ -32018,7 +32019,7 @@
           <a:p>
             <a:fld id="{5958763E-B898-436D-883D-03711491D54A}" type="datetimeFigureOut">
               <a:rPr lang="en-US" smtClean="0"/>
-              <a:t>9/2/2022</a:t>
+              <a:t>2/26/2024</a:t>
             </a:fld>
             <a:endParaRPr lang="en-US"/>
           </a:p>
@@ -32262,7 +32263,7 @@
           <a:p>
             <a:fld id="{5958763E-B898-436D-883D-03711491D54A}" type="datetimeFigureOut">
               <a:rPr lang="en-US" smtClean="0"/>
-              <a:t>9/2/2022</a:t>
+              <a:t>2/26/2024</a:t>
             </a:fld>
             <a:endParaRPr lang="en-US"/>
           </a:p>
@@ -35809,6 +35810,128 @@
 </file>
 
 <file path=ppt/slides/slide10.xml><?xml version="1.0" encoding="utf-8"?>
+<p:sld xmlns:a="http://schemas.openxmlformats.org/drawingml/2006/main" xmlns:r="http://schemas.openxmlformats.org/officeDocument/2006/relationships" xmlns:p="http://schemas.openxmlformats.org/presentationml/2006/main">
+  <p:cSld>
+    <p:spTree>
+      <p:nvGrpSpPr>
+        <p:cNvPr id="1" name=""/>
+        <p:cNvGrpSpPr/>
+        <p:nvPr/>
+      </p:nvGrpSpPr>
+      <p:grpSpPr>
+        <a:xfrm>
+          <a:off x="0" y="0"/>
+          <a:ext cx="0" cy="0"/>
+          <a:chOff x="0" y="0"/>
+          <a:chExt cx="0" cy="0"/>
+        </a:xfrm>
+      </p:grpSpPr>
+      <p:sp>
+        <p:nvSpPr>
+          <p:cNvPr id="2" name="Title 1">
+            <a:extLst>
+              <a:ext uri="{FF2B5EF4-FFF2-40B4-BE49-F238E27FC236}">
+                <a16:creationId xmlns:a16="http://schemas.microsoft.com/office/drawing/2014/main" id="{1AAE2480-6EC5-4F82-A8AF-E7F04F14C1DC}"/>
+              </a:ext>
+            </a:extLst>
+          </p:cNvPr>
+          <p:cNvSpPr>
+            <a:spLocks noGrp="1"/>
+          </p:cNvSpPr>
+          <p:nvPr>
+            <p:ph type="title"/>
+          </p:nvPr>
+        </p:nvSpPr>
+        <p:spPr/>
+        <p:txBody>
+          <a:bodyPr/>
+          <a:lstStyle/>
+          <a:p>
+            <a:r>
+              <a:rPr lang="en-US" dirty="0"/>
+              <a:t>Hello, Drake!</a:t>
+            </a:r>
+          </a:p>
+        </p:txBody>
+      </p:sp>
+      <p:sp>
+        <p:nvSpPr>
+          <p:cNvPr id="5" name="TextBox 4">
+            <a:extLst>
+              <a:ext uri="{FF2B5EF4-FFF2-40B4-BE49-F238E27FC236}">
+                <a16:creationId xmlns:a16="http://schemas.microsoft.com/office/drawing/2014/main" id="{57951CC6-2030-45B1-873D-920D27F40FFC}"/>
+              </a:ext>
+            </a:extLst>
+          </p:cNvPr>
+          <p:cNvSpPr txBox="1"/>
+          <p:nvPr/>
+        </p:nvSpPr>
+        <p:spPr>
+          <a:xfrm>
+            <a:off x="391668" y="2875002"/>
+            <a:ext cx="11430000" cy="1107996"/>
+          </a:xfrm>
+          <a:prstGeom prst="rect">
+            <a:avLst/>
+          </a:prstGeom>
+          <a:noFill/>
+        </p:spPr>
+        <p:txBody>
+          <a:bodyPr wrap="square">
+            <a:spAutoFit/>
+          </a:bodyPr>
+          <a:lstStyle/>
+          <a:p>
+            <a:pPr marL="0" indent="0" algn="ctr">
+              <a:buNone/>
+            </a:pPr>
+            <a:r>
+              <a:rPr lang="en-US" sz="6600" dirty="0">
+                <a:solidFill>
+                  <a:srgbClr val="000000"/>
+                </a:solidFill>
+                <a:latin typeface="Consolas" panose="020B0609020204030204" pitchFamily="49" charset="0"/>
+              </a:rPr>
+              <a:t>alert(</a:t>
+            </a:r>
+            <a:r>
+              <a:rPr lang="en-US" sz="6600" dirty="0">
+                <a:solidFill>
+                  <a:srgbClr val="A31515"/>
+                </a:solidFill>
+                <a:latin typeface="Consolas" panose="020B0609020204030204" pitchFamily="49" charset="0"/>
+              </a:rPr>
+              <a:t>"Hello, Drake!"</a:t>
+            </a:r>
+            <a:r>
+              <a:rPr lang="en-US" sz="6600" dirty="0">
+                <a:solidFill>
+                  <a:srgbClr val="000000"/>
+                </a:solidFill>
+                <a:latin typeface="Consolas" panose="020B0609020204030204" pitchFamily="49" charset="0"/>
+              </a:rPr>
+              <a:t>);</a:t>
+            </a:r>
+          </a:p>
+        </p:txBody>
+      </p:sp>
+    </p:spTree>
+    <p:extLst>
+      <p:ext uri="{BB962C8B-B14F-4D97-AF65-F5344CB8AC3E}">
+        <p14:creationId xmlns:p14="http://schemas.microsoft.com/office/powerpoint/2010/main" val="3270118950"/>
+      </p:ext>
+    </p:extLst>
+  </p:cSld>
+  <p:clrMapOvr>
+    <a:masterClrMapping/>
+  </p:clrMapOvr>
+  <p:transition>
+    <p:fade/>
+  </p:transition>
+</p:sld>
+</file>
+
+<file path=ppt/slides/slide11.xml><?xml version="1.0" encoding="utf-8"?>
 <p:sld xmlns:a="http://schemas.openxmlformats.org/drawingml/2006/main" xmlns:r="http://schemas.openxmlformats.org/officeDocument/2006/relationships" xmlns:p="http://schemas.openxmlformats.org/presentationml/2006/main">
   <p:cSld>
     <p:spTree>
@@ -39297,6 +39420,761 @@
           <a:p>
             <a:r>
               <a:rPr lang="en-US" dirty="0"/>
+              <a:t>Mini-challenge: Setup</a:t>
+            </a:r>
+          </a:p>
+        </p:txBody>
+      </p:sp>
+      <p:sp>
+        <p:nvSpPr>
+          <p:cNvPr id="3" name="Content Placeholder 2"/>
+          <p:cNvSpPr>
+            <a:spLocks noGrp="1"/>
+          </p:cNvSpPr>
+          <p:nvPr>
+            <p:ph idx="1"/>
+          </p:nvPr>
+        </p:nvSpPr>
+        <p:spPr>
+          <a:xfrm>
+            <a:off x="381000" y="1143000"/>
+            <a:ext cx="11430000" cy="3886200"/>
+          </a:xfrm>
+        </p:spPr>
+        <p:txBody>
+          <a:bodyPr anchor="ctr">
+            <a:normAutofit/>
+          </a:bodyPr>
+          <a:lstStyle/>
+          <a:p>
+            <a:pPr marL="800100" indent="-742950">
+              <a:buFont typeface="+mj-lt"/>
+              <a:buAutoNum type="arabicPeriod"/>
+            </a:pPr>
+            <a:r>
+              <a:rPr lang="en-US" sz="3200" dirty="0"/>
+              <a:t>Go to </a:t>
+            </a:r>
+            <a:r>
+              <a:rPr lang="en-US" sz="3200" b="1" u="sng" dirty="0">
+                <a:solidFill>
+                  <a:schemeClr val="accent1">
+                    <a:lumMod val="75000"/>
+                  </a:schemeClr>
+                </a:solidFill>
+              </a:rPr>
+              <a:t>replit.com</a:t>
+            </a:r>
+          </a:p>
+          <a:p>
+            <a:pPr marL="1143000" lvl="1" indent="-742950">
+              <a:buFont typeface="+mj-lt"/>
+              <a:buAutoNum type="arabicPeriod"/>
+            </a:pPr>
+            <a:r>
+              <a:rPr lang="en-US" sz="2800" dirty="0"/>
+              <a:t>Make sure you’re logged in</a:t>
+            </a:r>
+          </a:p>
+          <a:p>
+            <a:pPr marL="800100" indent="-742950">
+              <a:buFont typeface="+mj-lt"/>
+              <a:buAutoNum type="arabicPeriod"/>
+            </a:pPr>
+            <a:r>
+              <a:rPr lang="en-US" sz="3200" dirty="0"/>
+              <a:t>Click </a:t>
+            </a:r>
+            <a:r>
+              <a:rPr lang="en-US" sz="3200" b="1" dirty="0"/>
+              <a:t>+ Create Repl</a:t>
+            </a:r>
+            <a:endParaRPr lang="en-US" sz="3200" dirty="0"/>
+          </a:p>
+          <a:p>
+            <a:pPr marL="800100" indent="-742950">
+              <a:buFont typeface="+mj-lt"/>
+              <a:buAutoNum type="arabicPeriod"/>
+            </a:pPr>
+            <a:r>
+              <a:rPr lang="en-US" sz="3200" dirty="0"/>
+              <a:t>Select HTML, CSS, JS</a:t>
+            </a:r>
+          </a:p>
+          <a:p>
+            <a:pPr marL="800100" indent="-742950">
+              <a:buFont typeface="+mj-lt"/>
+              <a:buAutoNum type="arabicPeriod"/>
+            </a:pPr>
+            <a:r>
+              <a:rPr lang="en-US" sz="3200" dirty="0"/>
+              <a:t>Click </a:t>
+            </a:r>
+            <a:r>
+              <a:rPr lang="en-US" sz="3200" b="1" dirty="0"/>
+              <a:t>+ Create Repl</a:t>
+            </a:r>
+          </a:p>
+          <a:p>
+            <a:pPr marL="800100" indent="-742950">
+              <a:buFont typeface="+mj-lt"/>
+              <a:buAutoNum type="arabicPeriod"/>
+            </a:pPr>
+            <a:r>
+              <a:rPr lang="en-US" sz="3200" dirty="0"/>
+              <a:t>Open the </a:t>
+            </a:r>
+            <a:r>
+              <a:rPr lang="en-US" sz="3200" b="1" dirty="0"/>
+              <a:t>script.js</a:t>
+            </a:r>
+            <a:r>
+              <a:rPr lang="en-US" sz="3200" dirty="0"/>
+              <a:t> file</a:t>
+            </a:r>
+          </a:p>
+        </p:txBody>
+      </p:sp>
+      <p:pic>
+        <p:nvPicPr>
+          <p:cNvPr id="5" name="Picture 4">
+            <a:extLst>
+              <a:ext uri="{FF2B5EF4-FFF2-40B4-BE49-F238E27FC236}">
+                <a16:creationId xmlns:a16="http://schemas.microsoft.com/office/drawing/2014/main" id="{9AC09E03-0056-BBED-F6A3-8EB64A51CFE7}"/>
+              </a:ext>
+            </a:extLst>
+          </p:cNvPr>
+          <p:cNvPicPr>
+            <a:picLocks noChangeAspect="1"/>
+          </p:cNvPicPr>
+          <p:nvPr/>
+        </p:nvPicPr>
+        <p:blipFill>
+          <a:blip r:embed="rId2"/>
+          <a:stretch>
+            <a:fillRect/>
+          </a:stretch>
+        </p:blipFill>
+        <p:spPr>
+          <a:xfrm>
+            <a:off x="6781800" y="1718938"/>
+            <a:ext cx="2305372" cy="609685"/>
+          </a:xfrm>
+          <a:prstGeom prst="rect">
+            <a:avLst/>
+          </a:prstGeom>
+        </p:spPr>
+      </p:pic>
+      <p:pic>
+        <p:nvPicPr>
+          <p:cNvPr id="7" name="Picture 6">
+            <a:extLst>
+              <a:ext uri="{FF2B5EF4-FFF2-40B4-BE49-F238E27FC236}">
+                <a16:creationId xmlns:a16="http://schemas.microsoft.com/office/drawing/2014/main" id="{EF8EE8CF-9D62-03A0-7235-4D7A86E33646}"/>
+              </a:ext>
+            </a:extLst>
+          </p:cNvPr>
+          <p:cNvPicPr>
+            <a:picLocks noChangeAspect="1"/>
+          </p:cNvPicPr>
+          <p:nvPr/>
+        </p:nvPicPr>
+        <p:blipFill rotWithShape="1">
+          <a:blip r:embed="rId3"/>
+          <a:srcRect l="2198"/>
+          <a:stretch/>
+        </p:blipFill>
+        <p:spPr>
+          <a:xfrm>
+            <a:off x="5753100" y="2580325"/>
+            <a:ext cx="5943600" cy="3898105"/>
+          </a:xfrm>
+          <a:prstGeom prst="rect">
+            <a:avLst/>
+          </a:prstGeom>
+        </p:spPr>
+      </p:pic>
+      <p:pic>
+        <p:nvPicPr>
+          <p:cNvPr id="9" name="Picture 8">
+            <a:extLst>
+              <a:ext uri="{FF2B5EF4-FFF2-40B4-BE49-F238E27FC236}">
+                <a16:creationId xmlns:a16="http://schemas.microsoft.com/office/drawing/2014/main" id="{6674B6F4-F6C0-1770-192D-C4999DFEE50F}"/>
+              </a:ext>
+            </a:extLst>
+          </p:cNvPr>
+          <p:cNvPicPr>
+            <a:picLocks noChangeAspect="1"/>
+          </p:cNvPicPr>
+          <p:nvPr/>
+        </p:nvPicPr>
+        <p:blipFill>
+          <a:blip r:embed="rId4"/>
+          <a:stretch>
+            <a:fillRect/>
+          </a:stretch>
+        </p:blipFill>
+        <p:spPr>
+          <a:xfrm>
+            <a:off x="1409700" y="5059509"/>
+            <a:ext cx="2781688" cy="1590897"/>
+          </a:xfrm>
+          <a:prstGeom prst="rect">
+            <a:avLst/>
+          </a:prstGeom>
+        </p:spPr>
+      </p:pic>
+    </p:spTree>
+    <p:extLst>
+      <p:ext uri="{BB962C8B-B14F-4D97-AF65-F5344CB8AC3E}">
+        <p14:creationId xmlns:p14="http://schemas.microsoft.com/office/powerpoint/2010/main" val="2725968873"/>
+      </p:ext>
+    </p:extLst>
+  </p:cSld>
+  <p:clrMapOvr>
+    <a:masterClrMapping/>
+  </p:clrMapOvr>
+  <p:transition>
+    <p:fade/>
+  </p:transition>
+  <p:timing>
+    <p:tnLst>
+      <p:par>
+        <p:cTn id="1" dur="indefinite" restart="never" nodeType="tmRoot">
+          <p:childTnLst>
+            <p:seq concurrent="1" nextAc="seek">
+              <p:cTn id="2" dur="indefinite" nodeType="mainSeq">
+                <p:childTnLst>
+                  <p:par>
+                    <p:cTn id="3" fill="hold">
+                      <p:stCondLst>
+                        <p:cond delay="indefinite"/>
+                      </p:stCondLst>
+                      <p:childTnLst>
+                        <p:par>
+                          <p:cTn id="4" fill="hold">
+                            <p:stCondLst>
+                              <p:cond delay="0"/>
+                            </p:stCondLst>
+                            <p:childTnLst>
+                              <p:par>
+                                <p:cTn id="5" presetID="10" presetClass="entr" presetSubtype="0" fill="hold" nodeType="clickEffect">
+                                  <p:stCondLst>
+                                    <p:cond delay="0"/>
+                                  </p:stCondLst>
+                                  <p:childTnLst>
+                                    <p:set>
+                                      <p:cBhvr>
+                                        <p:cTn id="6" dur="1" fill="hold">
+                                          <p:stCondLst>
+                                            <p:cond delay="0"/>
+                                          </p:stCondLst>
+                                        </p:cTn>
+                                        <p:tgtEl>
+                                          <p:spTgt spid="3">
+                                            <p:txEl>
+                                              <p:pRg st="0" end="0"/>
+                                            </p:txEl>
+                                          </p:spTgt>
+                                        </p:tgtEl>
+                                        <p:attrNameLst>
+                                          <p:attrName>style.visibility</p:attrName>
+                                        </p:attrNameLst>
+                                      </p:cBhvr>
+                                      <p:to>
+                                        <p:strVal val="visible"/>
+                                      </p:to>
+                                    </p:set>
+                                    <p:animEffect transition="in" filter="fade">
+                                      <p:cBhvr>
+                                        <p:cTn id="7" dur="500"/>
+                                        <p:tgtEl>
+                                          <p:spTgt spid="3">
+                                            <p:txEl>
+                                              <p:pRg st="0" end="0"/>
+                                            </p:txEl>
+                                          </p:spTgt>
+                                        </p:tgtEl>
+                                      </p:cBhvr>
+                                    </p:animEffect>
+                                  </p:childTnLst>
+                                </p:cTn>
+                              </p:par>
+                            </p:childTnLst>
+                          </p:cTn>
+                        </p:par>
+                      </p:childTnLst>
+                    </p:cTn>
+                  </p:par>
+                  <p:par>
+                    <p:cTn id="8" fill="hold">
+                      <p:stCondLst>
+                        <p:cond delay="indefinite"/>
+                      </p:stCondLst>
+                      <p:childTnLst>
+                        <p:par>
+                          <p:cTn id="9" fill="hold">
+                            <p:stCondLst>
+                              <p:cond delay="0"/>
+                            </p:stCondLst>
+                            <p:childTnLst>
+                              <p:par>
+                                <p:cTn id="10" presetID="10" presetClass="entr" presetSubtype="0" fill="hold" nodeType="clickEffect">
+                                  <p:stCondLst>
+                                    <p:cond delay="0"/>
+                                  </p:stCondLst>
+                                  <p:childTnLst>
+                                    <p:set>
+                                      <p:cBhvr>
+                                        <p:cTn id="11" dur="1" fill="hold">
+                                          <p:stCondLst>
+                                            <p:cond delay="0"/>
+                                          </p:stCondLst>
+                                        </p:cTn>
+                                        <p:tgtEl>
+                                          <p:spTgt spid="3">
+                                            <p:txEl>
+                                              <p:pRg st="1" end="1"/>
+                                            </p:txEl>
+                                          </p:spTgt>
+                                        </p:tgtEl>
+                                        <p:attrNameLst>
+                                          <p:attrName>style.visibility</p:attrName>
+                                        </p:attrNameLst>
+                                      </p:cBhvr>
+                                      <p:to>
+                                        <p:strVal val="visible"/>
+                                      </p:to>
+                                    </p:set>
+                                    <p:animEffect transition="in" filter="fade">
+                                      <p:cBhvr>
+                                        <p:cTn id="12" dur="500"/>
+                                        <p:tgtEl>
+                                          <p:spTgt spid="3">
+                                            <p:txEl>
+                                              <p:pRg st="1" end="1"/>
+                                            </p:txEl>
+                                          </p:spTgt>
+                                        </p:tgtEl>
+                                      </p:cBhvr>
+                                    </p:animEffect>
+                                  </p:childTnLst>
+                                </p:cTn>
+                              </p:par>
+                            </p:childTnLst>
+                          </p:cTn>
+                        </p:par>
+                      </p:childTnLst>
+                    </p:cTn>
+                  </p:par>
+                  <p:par>
+                    <p:cTn id="13" fill="hold">
+                      <p:stCondLst>
+                        <p:cond delay="indefinite"/>
+                      </p:stCondLst>
+                      <p:childTnLst>
+                        <p:par>
+                          <p:cTn id="14" fill="hold">
+                            <p:stCondLst>
+                              <p:cond delay="0"/>
+                            </p:stCondLst>
+                            <p:childTnLst>
+                              <p:par>
+                                <p:cTn id="15" presetID="10" presetClass="entr" presetSubtype="0" fill="hold" nodeType="clickEffect">
+                                  <p:stCondLst>
+                                    <p:cond delay="0"/>
+                                  </p:stCondLst>
+                                  <p:childTnLst>
+                                    <p:set>
+                                      <p:cBhvr>
+                                        <p:cTn id="16" dur="1" fill="hold">
+                                          <p:stCondLst>
+                                            <p:cond delay="0"/>
+                                          </p:stCondLst>
+                                        </p:cTn>
+                                        <p:tgtEl>
+                                          <p:spTgt spid="3">
+                                            <p:txEl>
+                                              <p:pRg st="2" end="2"/>
+                                            </p:txEl>
+                                          </p:spTgt>
+                                        </p:tgtEl>
+                                        <p:attrNameLst>
+                                          <p:attrName>style.visibility</p:attrName>
+                                        </p:attrNameLst>
+                                      </p:cBhvr>
+                                      <p:to>
+                                        <p:strVal val="visible"/>
+                                      </p:to>
+                                    </p:set>
+                                    <p:animEffect transition="in" filter="fade">
+                                      <p:cBhvr>
+                                        <p:cTn id="17" dur="500"/>
+                                        <p:tgtEl>
+                                          <p:spTgt spid="3">
+                                            <p:txEl>
+                                              <p:pRg st="2" end="2"/>
+                                            </p:txEl>
+                                          </p:spTgt>
+                                        </p:tgtEl>
+                                      </p:cBhvr>
+                                    </p:animEffect>
+                                  </p:childTnLst>
+                                </p:cTn>
+                              </p:par>
+                              <p:par>
+                                <p:cTn id="18" presetID="10" presetClass="entr" presetSubtype="0" fill="hold" nodeType="withEffect">
+                                  <p:stCondLst>
+                                    <p:cond delay="0"/>
+                                  </p:stCondLst>
+                                  <p:childTnLst>
+                                    <p:set>
+                                      <p:cBhvr>
+                                        <p:cTn id="19" dur="1" fill="hold">
+                                          <p:stCondLst>
+                                            <p:cond delay="0"/>
+                                          </p:stCondLst>
+                                        </p:cTn>
+                                        <p:tgtEl>
+                                          <p:spTgt spid="5"/>
+                                        </p:tgtEl>
+                                        <p:attrNameLst>
+                                          <p:attrName>style.visibility</p:attrName>
+                                        </p:attrNameLst>
+                                      </p:cBhvr>
+                                      <p:to>
+                                        <p:strVal val="visible"/>
+                                      </p:to>
+                                    </p:set>
+                                    <p:animEffect transition="in" filter="fade">
+                                      <p:cBhvr>
+                                        <p:cTn id="20" dur="500"/>
+                                        <p:tgtEl>
+                                          <p:spTgt spid="5"/>
+                                        </p:tgtEl>
+                                      </p:cBhvr>
+                                    </p:animEffect>
+                                  </p:childTnLst>
+                                </p:cTn>
+                              </p:par>
+                            </p:childTnLst>
+                          </p:cTn>
+                        </p:par>
+                      </p:childTnLst>
+                    </p:cTn>
+                  </p:par>
+                  <p:par>
+                    <p:cTn id="21" fill="hold">
+                      <p:stCondLst>
+                        <p:cond delay="indefinite"/>
+                      </p:stCondLst>
+                      <p:childTnLst>
+                        <p:par>
+                          <p:cTn id="22" fill="hold">
+                            <p:stCondLst>
+                              <p:cond delay="0"/>
+                            </p:stCondLst>
+                            <p:childTnLst>
+                              <p:par>
+                                <p:cTn id="23" presetID="10" presetClass="entr" presetSubtype="0" fill="hold" nodeType="clickEffect">
+                                  <p:stCondLst>
+                                    <p:cond delay="0"/>
+                                  </p:stCondLst>
+                                  <p:childTnLst>
+                                    <p:set>
+                                      <p:cBhvr>
+                                        <p:cTn id="24" dur="1" fill="hold">
+                                          <p:stCondLst>
+                                            <p:cond delay="0"/>
+                                          </p:stCondLst>
+                                        </p:cTn>
+                                        <p:tgtEl>
+                                          <p:spTgt spid="3">
+                                            <p:txEl>
+                                              <p:pRg st="3" end="3"/>
+                                            </p:txEl>
+                                          </p:spTgt>
+                                        </p:tgtEl>
+                                        <p:attrNameLst>
+                                          <p:attrName>style.visibility</p:attrName>
+                                        </p:attrNameLst>
+                                      </p:cBhvr>
+                                      <p:to>
+                                        <p:strVal val="visible"/>
+                                      </p:to>
+                                    </p:set>
+                                    <p:animEffect transition="in" filter="fade">
+                                      <p:cBhvr>
+                                        <p:cTn id="25" dur="500"/>
+                                        <p:tgtEl>
+                                          <p:spTgt spid="3">
+                                            <p:txEl>
+                                              <p:pRg st="3" end="3"/>
+                                            </p:txEl>
+                                          </p:spTgt>
+                                        </p:tgtEl>
+                                      </p:cBhvr>
+                                    </p:animEffect>
+                                  </p:childTnLst>
+                                </p:cTn>
+                              </p:par>
+                            </p:childTnLst>
+                          </p:cTn>
+                        </p:par>
+                      </p:childTnLst>
+                    </p:cTn>
+                  </p:par>
+                  <p:par>
+                    <p:cTn id="26" fill="hold">
+                      <p:stCondLst>
+                        <p:cond delay="indefinite"/>
+                      </p:stCondLst>
+                      <p:childTnLst>
+                        <p:par>
+                          <p:cTn id="27" fill="hold">
+                            <p:stCondLst>
+                              <p:cond delay="0"/>
+                            </p:stCondLst>
+                            <p:childTnLst>
+                              <p:par>
+                                <p:cTn id="28" presetID="10" presetClass="entr" presetSubtype="0" fill="hold" nodeType="clickEffect">
+                                  <p:stCondLst>
+                                    <p:cond delay="0"/>
+                                  </p:stCondLst>
+                                  <p:childTnLst>
+                                    <p:set>
+                                      <p:cBhvr>
+                                        <p:cTn id="29" dur="1" fill="hold">
+                                          <p:stCondLst>
+                                            <p:cond delay="0"/>
+                                          </p:stCondLst>
+                                        </p:cTn>
+                                        <p:tgtEl>
+                                          <p:spTgt spid="3">
+                                            <p:txEl>
+                                              <p:pRg st="4" end="4"/>
+                                            </p:txEl>
+                                          </p:spTgt>
+                                        </p:tgtEl>
+                                        <p:attrNameLst>
+                                          <p:attrName>style.visibility</p:attrName>
+                                        </p:attrNameLst>
+                                      </p:cBhvr>
+                                      <p:to>
+                                        <p:strVal val="visible"/>
+                                      </p:to>
+                                    </p:set>
+                                    <p:animEffect transition="in" filter="fade">
+                                      <p:cBhvr>
+                                        <p:cTn id="30" dur="500"/>
+                                        <p:tgtEl>
+                                          <p:spTgt spid="3">
+                                            <p:txEl>
+                                              <p:pRg st="4" end="4"/>
+                                            </p:txEl>
+                                          </p:spTgt>
+                                        </p:tgtEl>
+                                      </p:cBhvr>
+                                    </p:animEffect>
+                                  </p:childTnLst>
+                                </p:cTn>
+                              </p:par>
+                              <p:par>
+                                <p:cTn id="31" presetID="10" presetClass="entr" presetSubtype="0" fill="hold" nodeType="withEffect">
+                                  <p:stCondLst>
+                                    <p:cond delay="0"/>
+                                  </p:stCondLst>
+                                  <p:childTnLst>
+                                    <p:set>
+                                      <p:cBhvr>
+                                        <p:cTn id="32" dur="1" fill="hold">
+                                          <p:stCondLst>
+                                            <p:cond delay="0"/>
+                                          </p:stCondLst>
+                                        </p:cTn>
+                                        <p:tgtEl>
+                                          <p:spTgt spid="7"/>
+                                        </p:tgtEl>
+                                        <p:attrNameLst>
+                                          <p:attrName>style.visibility</p:attrName>
+                                        </p:attrNameLst>
+                                      </p:cBhvr>
+                                      <p:to>
+                                        <p:strVal val="visible"/>
+                                      </p:to>
+                                    </p:set>
+                                    <p:animEffect transition="in" filter="fade">
+                                      <p:cBhvr>
+                                        <p:cTn id="33" dur="500"/>
+                                        <p:tgtEl>
+                                          <p:spTgt spid="7"/>
+                                        </p:tgtEl>
+                                      </p:cBhvr>
+                                    </p:animEffect>
+                                  </p:childTnLst>
+                                </p:cTn>
+                              </p:par>
+                            </p:childTnLst>
+                          </p:cTn>
+                        </p:par>
+                      </p:childTnLst>
+                    </p:cTn>
+                  </p:par>
+                  <p:par>
+                    <p:cTn id="34" fill="hold">
+                      <p:stCondLst>
+                        <p:cond delay="indefinite"/>
+                      </p:stCondLst>
+                      <p:childTnLst>
+                        <p:par>
+                          <p:cTn id="35" fill="hold">
+                            <p:stCondLst>
+                              <p:cond delay="0"/>
+                            </p:stCondLst>
+                            <p:childTnLst>
+                              <p:par>
+                                <p:cTn id="36" presetID="10" presetClass="entr" presetSubtype="0" fill="hold" nodeType="clickEffect">
+                                  <p:stCondLst>
+                                    <p:cond delay="0"/>
+                                  </p:stCondLst>
+                                  <p:childTnLst>
+                                    <p:set>
+                                      <p:cBhvr>
+                                        <p:cTn id="37" dur="1" fill="hold">
+                                          <p:stCondLst>
+                                            <p:cond delay="0"/>
+                                          </p:stCondLst>
+                                        </p:cTn>
+                                        <p:tgtEl>
+                                          <p:spTgt spid="3">
+                                            <p:txEl>
+                                              <p:pRg st="5" end="5"/>
+                                            </p:txEl>
+                                          </p:spTgt>
+                                        </p:tgtEl>
+                                        <p:attrNameLst>
+                                          <p:attrName>style.visibility</p:attrName>
+                                        </p:attrNameLst>
+                                      </p:cBhvr>
+                                      <p:to>
+                                        <p:strVal val="visible"/>
+                                      </p:to>
+                                    </p:set>
+                                    <p:animEffect transition="in" filter="fade">
+                                      <p:cBhvr>
+                                        <p:cTn id="38" dur="500"/>
+                                        <p:tgtEl>
+                                          <p:spTgt spid="3">
+                                            <p:txEl>
+                                              <p:pRg st="5" end="5"/>
+                                            </p:txEl>
+                                          </p:spTgt>
+                                        </p:tgtEl>
+                                      </p:cBhvr>
+                                    </p:animEffect>
+                                  </p:childTnLst>
+                                </p:cTn>
+                              </p:par>
+                              <p:par>
+                                <p:cTn id="39" presetID="10" presetClass="entr" presetSubtype="0" fill="hold" nodeType="withEffect">
+                                  <p:stCondLst>
+                                    <p:cond delay="0"/>
+                                  </p:stCondLst>
+                                  <p:childTnLst>
+                                    <p:set>
+                                      <p:cBhvr>
+                                        <p:cTn id="40" dur="1" fill="hold">
+                                          <p:stCondLst>
+                                            <p:cond delay="0"/>
+                                          </p:stCondLst>
+                                        </p:cTn>
+                                        <p:tgtEl>
+                                          <p:spTgt spid="9"/>
+                                        </p:tgtEl>
+                                        <p:attrNameLst>
+                                          <p:attrName>style.visibility</p:attrName>
+                                        </p:attrNameLst>
+                                      </p:cBhvr>
+                                      <p:to>
+                                        <p:strVal val="visible"/>
+                                      </p:to>
+                                    </p:set>
+                                    <p:animEffect transition="in" filter="fade">
+                                      <p:cBhvr>
+                                        <p:cTn id="41" dur="500"/>
+                                        <p:tgtEl>
+                                          <p:spTgt spid="9"/>
+                                        </p:tgtEl>
+                                      </p:cBhvr>
+                                    </p:animEffect>
+                                  </p:childTnLst>
+                                </p:cTn>
+                              </p:par>
+                            </p:childTnLst>
+                          </p:cTn>
+                        </p:par>
+                      </p:childTnLst>
+                    </p:cTn>
+                  </p:par>
+                </p:childTnLst>
+              </p:cTn>
+              <p:prevCondLst>
+                <p:cond evt="onPrev" delay="0">
+                  <p:tgtEl>
+                    <p:sldTgt/>
+                  </p:tgtEl>
+                </p:cond>
+              </p:prevCondLst>
+              <p:nextCondLst>
+                <p:cond evt="onNext" delay="0">
+                  <p:tgtEl>
+                    <p:sldTgt/>
+                  </p:tgtEl>
+                </p:cond>
+              </p:nextCondLst>
+            </p:seq>
+          </p:childTnLst>
+        </p:cTn>
+      </p:par>
+    </p:tnLst>
+  </p:timing>
+</p:sld>
+</file>
+
+<file path=ppt/slides/slide9.xml><?xml version="1.0" encoding="utf-8"?>
+<p:sld xmlns:a="http://schemas.openxmlformats.org/drawingml/2006/main" xmlns:r="http://schemas.openxmlformats.org/officeDocument/2006/relationships" xmlns:p="http://schemas.openxmlformats.org/presentationml/2006/main">
+  <p:cSld>
+    <p:spTree>
+      <p:nvGrpSpPr>
+        <p:cNvPr id="1" name=""/>
+        <p:cNvGrpSpPr/>
+        <p:nvPr/>
+      </p:nvGrpSpPr>
+      <p:grpSpPr>
+        <a:xfrm>
+          <a:off x="0" y="0"/>
+          <a:ext cx="0" cy="0"/>
+          <a:chOff x="0" y="0"/>
+          <a:chExt cx="0" cy="0"/>
+        </a:xfrm>
+      </p:grpSpPr>
+      <p:sp>
+        <p:nvSpPr>
+          <p:cNvPr id="2" name="Title 1"/>
+          <p:cNvSpPr>
+            <a:spLocks noGrp="1"/>
+          </p:cNvSpPr>
+          <p:nvPr>
+            <p:ph type="title"/>
+          </p:nvPr>
+        </p:nvSpPr>
+        <p:spPr/>
+        <p:txBody>
+          <a:bodyPr/>
+          <a:lstStyle/>
+          <a:p>
+            <a:r>
+              <a:rPr lang="en-US" dirty="0"/>
               <a:t>Mini-challenge</a:t>
             </a:r>
           </a:p>
@@ -39351,129 +40229,7 @@
     </p:spTree>
     <p:extLst>
       <p:ext uri="{BB962C8B-B14F-4D97-AF65-F5344CB8AC3E}">
-        <p14:creationId xmlns:p14="http://schemas.microsoft.com/office/powerpoint/2010/main" val="2725968873"/>
-      </p:ext>
-    </p:extLst>
-  </p:cSld>
-  <p:clrMapOvr>
-    <a:masterClrMapping/>
-  </p:clrMapOvr>
-  <p:transition>
-    <p:fade/>
-  </p:transition>
-</p:sld>
-</file>
-
-<file path=ppt/slides/slide9.xml><?xml version="1.0" encoding="utf-8"?>
-<p:sld xmlns:a="http://schemas.openxmlformats.org/drawingml/2006/main" xmlns:r="http://schemas.openxmlformats.org/officeDocument/2006/relationships" xmlns:p="http://schemas.openxmlformats.org/presentationml/2006/main">
-  <p:cSld>
-    <p:spTree>
-      <p:nvGrpSpPr>
-        <p:cNvPr id="1" name=""/>
-        <p:cNvGrpSpPr/>
-        <p:nvPr/>
-      </p:nvGrpSpPr>
-      <p:grpSpPr>
-        <a:xfrm>
-          <a:off x="0" y="0"/>
-          <a:ext cx="0" cy="0"/>
-          <a:chOff x="0" y="0"/>
-          <a:chExt cx="0" cy="0"/>
-        </a:xfrm>
-      </p:grpSpPr>
-      <p:sp>
-        <p:nvSpPr>
-          <p:cNvPr id="2" name="Title 1">
-            <a:extLst>
-              <a:ext uri="{FF2B5EF4-FFF2-40B4-BE49-F238E27FC236}">
-                <a16:creationId xmlns:a16="http://schemas.microsoft.com/office/drawing/2014/main" id="{1AAE2480-6EC5-4F82-A8AF-E7F04F14C1DC}"/>
-              </a:ext>
-            </a:extLst>
-          </p:cNvPr>
-          <p:cNvSpPr>
-            <a:spLocks noGrp="1"/>
-          </p:cNvSpPr>
-          <p:nvPr>
-            <p:ph type="title"/>
-          </p:nvPr>
-        </p:nvSpPr>
-        <p:spPr/>
-        <p:txBody>
-          <a:bodyPr/>
-          <a:lstStyle/>
-          <a:p>
-            <a:r>
-              <a:rPr lang="en-US" dirty="0"/>
-              <a:t>Hello, Drake!</a:t>
-            </a:r>
-          </a:p>
-        </p:txBody>
-      </p:sp>
-      <p:sp>
-        <p:nvSpPr>
-          <p:cNvPr id="5" name="TextBox 4">
-            <a:extLst>
-              <a:ext uri="{FF2B5EF4-FFF2-40B4-BE49-F238E27FC236}">
-                <a16:creationId xmlns:a16="http://schemas.microsoft.com/office/drawing/2014/main" id="{57951CC6-2030-45B1-873D-920D27F40FFC}"/>
-              </a:ext>
-            </a:extLst>
-          </p:cNvPr>
-          <p:cNvSpPr txBox="1"/>
-          <p:nvPr/>
-        </p:nvSpPr>
-        <p:spPr>
-          <a:xfrm>
-            <a:off x="391668" y="2875002"/>
-            <a:ext cx="11430000" cy="1107996"/>
-          </a:xfrm>
-          <a:prstGeom prst="rect">
-            <a:avLst/>
-          </a:prstGeom>
-          <a:noFill/>
-        </p:spPr>
-        <p:txBody>
-          <a:bodyPr wrap="square">
-            <a:spAutoFit/>
-          </a:bodyPr>
-          <a:lstStyle/>
-          <a:p>
-            <a:pPr marL="0" indent="0" algn="ctr">
-              <a:buNone/>
-            </a:pPr>
-            <a:r>
-              <a:rPr lang="en-US" sz="6600" dirty="0">
-                <a:solidFill>
-                  <a:srgbClr val="000000"/>
-                </a:solidFill>
-                <a:latin typeface="Consolas" panose="020B0609020204030204" pitchFamily="49" charset="0"/>
-              </a:rPr>
-              <a:t>alert(</a:t>
-            </a:r>
-            <a:r>
-              <a:rPr lang="en-US" sz="6600" dirty="0">
-                <a:solidFill>
-                  <a:srgbClr val="A31515"/>
-                </a:solidFill>
-                <a:latin typeface="Consolas" panose="020B0609020204030204" pitchFamily="49" charset="0"/>
-              </a:rPr>
-              <a:t>"Hello, Drake!"</a:t>
-            </a:r>
-            <a:r>
-              <a:rPr lang="en-US" sz="6600" dirty="0">
-                <a:solidFill>
-                  <a:srgbClr val="000000"/>
-                </a:solidFill>
-                <a:latin typeface="Consolas" panose="020B0609020204030204" pitchFamily="49" charset="0"/>
-              </a:rPr>
-              <a:t>);</a:t>
-            </a:r>
-          </a:p>
-        </p:txBody>
-      </p:sp>
-    </p:spTree>
-    <p:extLst>
-      <p:ext uri="{BB962C8B-B14F-4D97-AF65-F5344CB8AC3E}">
-        <p14:creationId xmlns:p14="http://schemas.microsoft.com/office/powerpoint/2010/main" val="3270118950"/>
+        <p14:creationId xmlns:p14="http://schemas.microsoft.com/office/powerpoint/2010/main" val="1164853227"/>
       </p:ext>
     </p:extLst>
   </p:cSld>

</xml_diff>

<commit_message>
use jsfiddle instead of glitch
</commit_message>
<xml_diff>
--- a/IntroToJS/IntroductionToJavaScript.pptx
+++ b/IntroToJS/IntroductionToJavaScript.pptx
@@ -218,7 +218,7 @@
           <a:p>
             <a:fld id="{19104133-B5B0-4351-8158-4F0E5EB1E2BF}" type="datetimeFigureOut">
               <a:rPr lang="en-US" smtClean="0"/>
-              <a:t>9/4/2024</a:t>
+              <a:t>2/26/2025</a:t>
             </a:fld>
             <a:endParaRPr lang="en-US"/>
           </a:p>
@@ -1197,7 +1197,7 @@
             <a:fld id="{1C2D31DE-C454-491C-B5C3-F097855E3DF7}" type="datetime4">
               <a:rPr lang="en-US" smtClean="0"/>
               <a:pPr/>
-              <a:t>September 4, 2024</a:t>
+              <a:t>February 26, 2025</a:t>
             </a:fld>
             <a:endParaRPr lang="en-US" dirty="0"/>
           </a:p>
@@ -4589,7 +4589,7 @@
           <a:p>
             <a:fld id="{5958763E-B898-436D-883D-03711491D54A}" type="datetimeFigureOut">
               <a:rPr lang="en-US" smtClean="0"/>
-              <a:t>9/4/2024</a:t>
+              <a:t>2/26/2025</a:t>
             </a:fld>
             <a:endParaRPr lang="en-US"/>
           </a:p>
@@ -4782,7 +4782,7 @@
           <a:p>
             <a:fld id="{5958763E-B898-436D-883D-03711491D54A}" type="datetimeFigureOut">
               <a:rPr lang="en-US" smtClean="0"/>
-              <a:t>9/4/2024</a:t>
+              <a:t>2/26/2025</a:t>
             </a:fld>
             <a:endParaRPr lang="en-US"/>
           </a:p>
@@ -5032,7 +5032,7 @@
           <a:p>
             <a:fld id="{5958763E-B898-436D-883D-03711491D54A}" type="datetimeFigureOut">
               <a:rPr lang="en-US" smtClean="0"/>
-              <a:t>9/4/2024</a:t>
+              <a:t>2/26/2025</a:t>
             </a:fld>
             <a:endParaRPr lang="en-US"/>
           </a:p>
@@ -5380,7 +5380,7 @@
           <a:p>
             <a:fld id="{5958763E-B898-436D-883D-03711491D54A}" type="datetimeFigureOut">
               <a:rPr lang="en-US" smtClean="0"/>
-              <a:t>9/4/2024</a:t>
+              <a:t>2/26/2025</a:t>
             </a:fld>
             <a:endParaRPr lang="en-US"/>
           </a:p>
@@ -5796,7 +5796,7 @@
           <a:p>
             <a:fld id="{5958763E-B898-436D-883D-03711491D54A}" type="datetimeFigureOut">
               <a:rPr lang="en-US" smtClean="0"/>
-              <a:t>9/4/2024</a:t>
+              <a:t>2/26/2025</a:t>
             </a:fld>
             <a:endParaRPr lang="en-US"/>
           </a:p>
@@ -6297,7 +6297,7 @@
           <a:p>
             <a:fld id="{5958763E-B898-436D-883D-03711491D54A}" type="datetimeFigureOut">
               <a:rPr lang="en-US" smtClean="0"/>
-              <a:t>9/4/2024</a:t>
+              <a:t>2/26/2025</a:t>
             </a:fld>
             <a:endParaRPr lang="en-US"/>
           </a:p>
@@ -6748,7 +6748,7 @@
           <a:p>
             <a:fld id="{5958763E-B898-436D-883D-03711491D54A}" type="datetimeFigureOut">
               <a:rPr lang="en-US" smtClean="0"/>
-              <a:t>9/4/2024</a:t>
+              <a:t>2/26/2025</a:t>
             </a:fld>
             <a:endParaRPr lang="en-US"/>
           </a:p>
@@ -7359,7 +7359,7 @@
           <a:p>
             <a:fld id="{5958763E-B898-436D-883D-03711491D54A}" type="datetimeFigureOut">
               <a:rPr lang="en-US" smtClean="0"/>
-              <a:t>9/4/2024</a:t>
+              <a:t>2/26/2025</a:t>
             </a:fld>
             <a:endParaRPr lang="en-US"/>
           </a:p>
@@ -8130,7 +8130,7 @@
           <a:p>
             <a:fld id="{5958763E-B898-436D-883D-03711491D54A}" type="datetimeFigureOut">
               <a:rPr lang="en-US" smtClean="0"/>
-              <a:t>9/4/2024</a:t>
+              <a:t>2/26/2025</a:t>
             </a:fld>
             <a:endParaRPr lang="en-US"/>
           </a:p>
@@ -8234,7 +8234,7 @@
           <a:p>
             <a:fld id="{5958763E-B898-436D-883D-03711491D54A}" type="datetimeFigureOut">
               <a:rPr lang="en-US" smtClean="0"/>
-              <a:t>9/4/2024</a:t>
+              <a:t>2/26/2025</a:t>
             </a:fld>
             <a:endParaRPr lang="en-US"/>
           </a:p>
@@ -8561,7 +8561,7 @@
             <a:fld id="{1C2D31DE-C454-491C-B5C3-F097855E3DF7}" type="datetime4">
               <a:rPr lang="en-US" smtClean="0"/>
               <a:pPr/>
-              <a:t>September 4, 2024</a:t>
+              <a:t>February 26, 2025</a:t>
             </a:fld>
             <a:endParaRPr lang="en-US" dirty="0"/>
           </a:p>
@@ -11713,7 +11713,7 @@
           <a:p>
             <a:fld id="{5958763E-B898-436D-883D-03711491D54A}" type="datetimeFigureOut">
               <a:rPr lang="en-US" smtClean="0"/>
-              <a:t>9/4/2024</a:t>
+              <a:t>2/26/2025</a:t>
             </a:fld>
             <a:endParaRPr lang="en-US"/>
           </a:p>
@@ -11837,7 +11837,7 @@
           <a:p>
             <a:fld id="{5958763E-B898-436D-883D-03711491D54A}" type="datetimeFigureOut">
               <a:rPr lang="en-US" smtClean="0"/>
-              <a:t>9/4/2024</a:t>
+              <a:t>2/26/2025</a:t>
             </a:fld>
             <a:endParaRPr lang="en-US"/>
           </a:p>
@@ -11961,7 +11961,7 @@
           <a:p>
             <a:fld id="{5958763E-B898-436D-883D-03711491D54A}" type="datetimeFigureOut">
               <a:rPr lang="en-US" smtClean="0"/>
-              <a:t>9/4/2024</a:t>
+              <a:t>2/26/2025</a:t>
             </a:fld>
             <a:endParaRPr lang="en-US"/>
           </a:p>
@@ -12085,7 +12085,7 @@
           <a:p>
             <a:fld id="{5958763E-B898-436D-883D-03711491D54A}" type="datetimeFigureOut">
               <a:rPr lang="en-US" smtClean="0"/>
-              <a:t>9/4/2024</a:t>
+              <a:t>2/26/2025</a:t>
             </a:fld>
             <a:endParaRPr lang="en-US"/>
           </a:p>
@@ -12209,7 +12209,7 @@
           <a:p>
             <a:fld id="{5958763E-B898-436D-883D-03711491D54A}" type="datetimeFigureOut">
               <a:rPr lang="en-US" smtClean="0"/>
-              <a:t>9/4/2024</a:t>
+              <a:t>2/26/2025</a:t>
             </a:fld>
             <a:endParaRPr lang="en-US"/>
           </a:p>
@@ -12333,7 +12333,7 @@
           <a:p>
             <a:fld id="{5958763E-B898-436D-883D-03711491D54A}" type="datetimeFigureOut">
               <a:rPr lang="en-US" smtClean="0"/>
-              <a:t>9/4/2024</a:t>
+              <a:t>2/26/2025</a:t>
             </a:fld>
             <a:endParaRPr lang="en-US"/>
           </a:p>
@@ -12457,7 +12457,7 @@
           <a:p>
             <a:fld id="{5958763E-B898-436D-883D-03711491D54A}" type="datetimeFigureOut">
               <a:rPr lang="en-US" smtClean="0"/>
-              <a:t>9/4/2024</a:t>
+              <a:t>2/26/2025</a:t>
             </a:fld>
             <a:endParaRPr lang="en-US"/>
           </a:p>
@@ -12581,7 +12581,7 @@
           <a:p>
             <a:fld id="{5958763E-B898-436D-883D-03711491D54A}" type="datetimeFigureOut">
               <a:rPr lang="en-US" smtClean="0"/>
-              <a:t>9/4/2024</a:t>
+              <a:t>2/26/2025</a:t>
             </a:fld>
             <a:endParaRPr lang="en-US"/>
           </a:p>
@@ -12714,7 +12714,7 @@
           <a:p>
             <a:fld id="{5958763E-B898-436D-883D-03711491D54A}" type="datetimeFigureOut">
               <a:rPr lang="en-US" smtClean="0"/>
-              <a:t>9/4/2024</a:t>
+              <a:t>2/26/2025</a:t>
             </a:fld>
             <a:endParaRPr lang="en-US"/>
           </a:p>
@@ -16053,7 +16053,7 @@
             <a:fld id="{1C2D31DE-C454-491C-B5C3-F097855E3DF7}" type="datetime4">
               <a:rPr lang="en-US" smtClean="0"/>
               <a:pPr/>
-              <a:t>September 4, 2024</a:t>
+              <a:t>February 26, 2025</a:t>
             </a:fld>
             <a:endParaRPr lang="en-US" dirty="0"/>
           </a:p>
@@ -28289,7 +28289,7 @@
           <a:p>
             <a:fld id="{5958763E-B898-436D-883D-03711491D54A}" type="datetimeFigureOut">
               <a:rPr lang="en-US" smtClean="0"/>
-              <a:t>9/4/2024</a:t>
+              <a:t>2/26/2025</a:t>
             </a:fld>
             <a:endParaRPr lang="en-US"/>
           </a:p>
@@ -28691,7 +28691,7 @@
           <a:p>
             <a:fld id="{5958763E-B898-436D-883D-03711491D54A}" type="datetimeFigureOut">
               <a:rPr lang="en-US" smtClean="0"/>
-              <a:t>9/4/2024</a:t>
+              <a:t>2/26/2025</a:t>
             </a:fld>
             <a:endParaRPr lang="en-US"/>
           </a:p>
@@ -28985,7 +28985,7 @@
           <a:p>
             <a:fld id="{5958763E-B898-436D-883D-03711491D54A}" type="datetimeFigureOut">
               <a:rPr lang="en-US" smtClean="0"/>
-              <a:t>9/4/2024</a:t>
+              <a:t>2/26/2025</a:t>
             </a:fld>
             <a:endParaRPr lang="en-US"/>
           </a:p>
@@ -29186,7 +29186,7 @@
           <a:p>
             <a:fld id="{5958763E-B898-436D-883D-03711491D54A}" type="datetimeFigureOut">
               <a:rPr lang="en-US" smtClean="0"/>
-              <a:t>9/4/2024</a:t>
+              <a:t>2/26/2025</a:t>
             </a:fld>
             <a:endParaRPr lang="en-US"/>
           </a:p>
@@ -29447,7 +29447,7 @@
           <a:p>
             <a:fld id="{5958763E-B898-436D-883D-03711491D54A}" type="datetimeFigureOut">
               <a:rPr lang="en-US" smtClean="0"/>
-              <a:t>9/4/2024</a:t>
+              <a:t>2/26/2025</a:t>
             </a:fld>
             <a:endParaRPr lang="en-US"/>
           </a:p>
@@ -29955,7 +29955,7 @@
           <a:p>
             <a:fld id="{5958763E-B898-436D-883D-03711491D54A}" type="datetimeFigureOut">
               <a:rPr lang="en-US" smtClean="0"/>
-              <a:t>9/4/2024</a:t>
+              <a:t>2/26/2025</a:t>
             </a:fld>
             <a:endParaRPr lang="en-US"/>
           </a:p>
@@ -30434,7 +30434,7 @@
           <a:p>
             <a:fld id="{5958763E-B898-436D-883D-03711491D54A}" type="datetimeFigureOut">
               <a:rPr lang="en-US" smtClean="0"/>
-              <a:t>9/4/2024</a:t>
+              <a:t>2/26/2025</a:t>
             </a:fld>
             <a:endParaRPr lang="en-US"/>
           </a:p>
@@ -31253,7 +31253,7 @@
           <a:p>
             <a:fld id="{5958763E-B898-436D-883D-03711491D54A}" type="datetimeFigureOut">
               <a:rPr lang="en-US" smtClean="0"/>
-              <a:t>9/4/2024</a:t>
+              <a:t>2/26/2025</a:t>
             </a:fld>
             <a:endParaRPr lang="en-US"/>
           </a:p>
@@ -31454,7 +31454,7 @@
           <a:p>
             <a:fld id="{5958763E-B898-436D-883D-03711491D54A}" type="datetimeFigureOut">
               <a:rPr lang="en-US" smtClean="0"/>
-              <a:t>9/4/2024</a:t>
+              <a:t>2/26/2025</a:t>
             </a:fld>
             <a:endParaRPr lang="en-US"/>
           </a:p>
@@ -31789,7 +31789,7 @@
           <a:p>
             <a:fld id="{5958763E-B898-436D-883D-03711491D54A}" type="datetimeFigureOut">
               <a:rPr lang="en-US" smtClean="0"/>
-              <a:t>9/4/2024</a:t>
+              <a:t>2/26/2025</a:t>
             </a:fld>
             <a:endParaRPr lang="en-US"/>
           </a:p>
@@ -32019,7 +32019,7 @@
           <a:p>
             <a:fld id="{5958763E-B898-436D-883D-03711491D54A}" type="datetimeFigureOut">
               <a:rPr lang="en-US" smtClean="0"/>
-              <a:t>9/4/2024</a:t>
+              <a:t>2/26/2025</a:t>
             </a:fld>
             <a:endParaRPr lang="en-US"/>
           </a:p>
@@ -32263,7 +32263,7 @@
           <a:p>
             <a:fld id="{5958763E-B898-436D-883D-03711491D54A}" type="datetimeFigureOut">
               <a:rPr lang="en-US" smtClean="0"/>
-              <a:t>9/4/2024</a:t>
+              <a:t>2/26/2025</a:t>
             </a:fld>
             <a:endParaRPr lang="en-US"/>
           </a:p>
@@ -39438,7 +39438,7 @@
         <p:spPr>
           <a:xfrm>
             <a:off x="381000" y="1143000"/>
-            <a:ext cx="11430000" cy="3886200"/>
+            <a:ext cx="11430000" cy="1714500"/>
           </a:xfrm>
         </p:spPr>
         <p:txBody>
@@ -39456,14 +39456,14 @@
               <a:t>Go to </a:t>
             </a:r>
             <a:r>
-              <a:rPr lang="en-US" sz="3200" b="1" u="sng" dirty="0">
+              <a:rPr lang="en-US" sz="5400" b="1" dirty="0">
                 <a:solidFill>
                   <a:schemeClr val="accent1">
                     <a:lumMod val="75000"/>
                   </a:schemeClr>
                 </a:solidFill>
               </a:rPr>
-              <a:t>hylandtechclub.com/web-102</a:t>
+              <a:t>jsfiddle.net</a:t>
             </a:r>
           </a:p>
           <a:p>
@@ -39473,37 +39473,49 @@
             </a:pPr>
             <a:r>
               <a:rPr lang="en-US" sz="3200" dirty="0"/>
-              <a:t>Open the </a:t>
+              <a:t>Click into the </a:t>
             </a:r>
             <a:r>
               <a:rPr lang="en-US" sz="3200" b="1" dirty="0"/>
-              <a:t>JavaScript Starter project</a:t>
-            </a:r>
-          </a:p>
-          <a:p>
-            <a:pPr marL="800100" indent="-742950">
-              <a:buFont typeface="+mj-lt"/>
-              <a:buAutoNum type="arabicPeriod"/>
-            </a:pPr>
-            <a:r>
-              <a:rPr lang="en-US" sz="3200"/>
-              <a:t>Open </a:t>
+              <a:t>JavaScript</a:t>
             </a:r>
             <a:r>
               <a:rPr lang="en-US" sz="3200" dirty="0"/>
-              <a:t>the </a:t>
-            </a:r>
-            <a:r>
-              <a:rPr lang="en-US" sz="3200" b="1" dirty="0"/>
-              <a:t>script.js</a:t>
-            </a:r>
-            <a:r>
-              <a:rPr lang="en-US" sz="3200" dirty="0"/>
-              <a:t> file</a:t>
+              <a:t> section (bottom left)</a:t>
             </a:r>
           </a:p>
         </p:txBody>
       </p:sp>
+      <p:pic>
+        <p:nvPicPr>
+          <p:cNvPr id="5" name="Picture 4">
+            <a:extLst>
+              <a:ext uri="{FF2B5EF4-FFF2-40B4-BE49-F238E27FC236}">
+                <a16:creationId xmlns:a16="http://schemas.microsoft.com/office/drawing/2014/main" id="{0E80C3F2-339F-6F55-1458-488B769478D5}"/>
+              </a:ext>
+            </a:extLst>
+          </p:cNvPr>
+          <p:cNvPicPr>
+            <a:picLocks noChangeAspect="1"/>
+          </p:cNvPicPr>
+          <p:nvPr/>
+        </p:nvPicPr>
+        <p:blipFill>
+          <a:blip r:embed="rId2"/>
+          <a:stretch>
+            <a:fillRect/>
+          </a:stretch>
+        </p:blipFill>
+        <p:spPr>
+          <a:xfrm>
+            <a:off x="0" y="2459022"/>
+            <a:ext cx="12192000" cy="4437506"/>
+          </a:xfrm>
+          <a:prstGeom prst="rect">
+            <a:avLst/>
+          </a:prstGeom>
+        </p:spPr>
+      </p:pic>
     </p:spTree>
     <p:extLst>
       <p:ext uri="{BB962C8B-B14F-4D97-AF65-F5344CB8AC3E}">
@@ -39633,67 +39645,6 @@
                                           <p:spTgt spid="3">
                                             <p:txEl>
                                               <p:pRg st="1" end="1"/>
-                                            </p:txEl>
-                                          </p:spTgt>
-                                        </p:tgtEl>
-                                      </p:cBhvr>
-                                    </p:animEffect>
-                                  </p:childTnLst>
-                                </p:cTn>
-                              </p:par>
-                            </p:childTnLst>
-                          </p:cTn>
-                        </p:par>
-                      </p:childTnLst>
-                    </p:cTn>
-                  </p:par>
-                  <p:par>
-                    <p:cTn id="13" fill="hold">
-                      <p:stCondLst>
-                        <p:cond delay="indefinite"/>
-                      </p:stCondLst>
-                      <p:childTnLst>
-                        <p:par>
-                          <p:cTn id="14" fill="hold">
-                            <p:stCondLst>
-                              <p:cond delay="0"/>
-                            </p:stCondLst>
-                            <p:childTnLst>
-                              <p:par>
-                                <p:cTn id="15" presetID="10" presetClass="entr" presetSubtype="0" fill="hold" nodeType="clickEffect">
-                                  <p:stCondLst>
-                                    <p:cond delay="0"/>
-                                  </p:stCondLst>
-                                  <p:childTnLst>
-                                    <p:set>
-                                      <p:cBhvr>
-                                        <p:cTn id="16" dur="1" fill="hold">
-                                          <p:stCondLst>
-                                            <p:cond delay="0"/>
-                                          </p:stCondLst>
-                                        </p:cTn>
-                                        <p:tgtEl>
-                                          <p:spTgt spid="3">
-                                            <p:txEl>
-                                              <p:pRg st="2" end="2"/>
-                                            </p:txEl>
-                                          </p:spTgt>
-                                        </p:tgtEl>
-                                        <p:attrNameLst>
-                                          <p:attrName>style.visibility</p:attrName>
-                                        </p:attrNameLst>
-                                      </p:cBhvr>
-                                      <p:to>
-                                        <p:strVal val="visible"/>
-                                      </p:to>
-                                    </p:set>
-                                    <p:animEffect transition="in" filter="fade">
-                                      <p:cBhvr>
-                                        <p:cTn id="17" dur="500"/>
-                                        <p:tgtEl>
-                                          <p:spTgt spid="3">
-                                            <p:txEl>
-                                              <p:pRg st="2" end="2"/>
                                             </p:txEl>
                                           </p:spTgt>
                                         </p:tgtEl>

</xml_diff>

<commit_message>
Update gitbook 2025-02-26 20:28:22
</commit_message>
<xml_diff>
--- a/IntroToJS/IntroductionToJavaScript.pptx
+++ b/IntroToJS/IntroductionToJavaScript.pptx
@@ -218,7 +218,7 @@
           <a:p>
             <a:fld id="{19104133-B5B0-4351-8158-4F0E5EB1E2BF}" type="datetimeFigureOut">
               <a:rPr lang="en-US" smtClean="0"/>
-              <a:t>9/4/2024</a:t>
+              <a:t>2/26/2025</a:t>
             </a:fld>
             <a:endParaRPr lang="en-US"/>
           </a:p>
@@ -1197,7 +1197,7 @@
             <a:fld id="{1C2D31DE-C454-491C-B5C3-F097855E3DF7}" type="datetime4">
               <a:rPr lang="en-US" smtClean="0"/>
               <a:pPr/>
-              <a:t>September 4, 2024</a:t>
+              <a:t>February 26, 2025</a:t>
             </a:fld>
             <a:endParaRPr lang="en-US" dirty="0"/>
           </a:p>
@@ -4589,7 +4589,7 @@
           <a:p>
             <a:fld id="{5958763E-B898-436D-883D-03711491D54A}" type="datetimeFigureOut">
               <a:rPr lang="en-US" smtClean="0"/>
-              <a:t>9/4/2024</a:t>
+              <a:t>2/26/2025</a:t>
             </a:fld>
             <a:endParaRPr lang="en-US"/>
           </a:p>
@@ -4782,7 +4782,7 @@
           <a:p>
             <a:fld id="{5958763E-B898-436D-883D-03711491D54A}" type="datetimeFigureOut">
               <a:rPr lang="en-US" smtClean="0"/>
-              <a:t>9/4/2024</a:t>
+              <a:t>2/26/2025</a:t>
             </a:fld>
             <a:endParaRPr lang="en-US"/>
           </a:p>
@@ -5032,7 +5032,7 @@
           <a:p>
             <a:fld id="{5958763E-B898-436D-883D-03711491D54A}" type="datetimeFigureOut">
               <a:rPr lang="en-US" smtClean="0"/>
-              <a:t>9/4/2024</a:t>
+              <a:t>2/26/2025</a:t>
             </a:fld>
             <a:endParaRPr lang="en-US"/>
           </a:p>
@@ -5380,7 +5380,7 @@
           <a:p>
             <a:fld id="{5958763E-B898-436D-883D-03711491D54A}" type="datetimeFigureOut">
               <a:rPr lang="en-US" smtClean="0"/>
-              <a:t>9/4/2024</a:t>
+              <a:t>2/26/2025</a:t>
             </a:fld>
             <a:endParaRPr lang="en-US"/>
           </a:p>
@@ -5796,7 +5796,7 @@
           <a:p>
             <a:fld id="{5958763E-B898-436D-883D-03711491D54A}" type="datetimeFigureOut">
               <a:rPr lang="en-US" smtClean="0"/>
-              <a:t>9/4/2024</a:t>
+              <a:t>2/26/2025</a:t>
             </a:fld>
             <a:endParaRPr lang="en-US"/>
           </a:p>
@@ -6297,7 +6297,7 @@
           <a:p>
             <a:fld id="{5958763E-B898-436D-883D-03711491D54A}" type="datetimeFigureOut">
               <a:rPr lang="en-US" smtClean="0"/>
-              <a:t>9/4/2024</a:t>
+              <a:t>2/26/2025</a:t>
             </a:fld>
             <a:endParaRPr lang="en-US"/>
           </a:p>
@@ -6748,7 +6748,7 @@
           <a:p>
             <a:fld id="{5958763E-B898-436D-883D-03711491D54A}" type="datetimeFigureOut">
               <a:rPr lang="en-US" smtClean="0"/>
-              <a:t>9/4/2024</a:t>
+              <a:t>2/26/2025</a:t>
             </a:fld>
             <a:endParaRPr lang="en-US"/>
           </a:p>
@@ -7359,7 +7359,7 @@
           <a:p>
             <a:fld id="{5958763E-B898-436D-883D-03711491D54A}" type="datetimeFigureOut">
               <a:rPr lang="en-US" smtClean="0"/>
-              <a:t>9/4/2024</a:t>
+              <a:t>2/26/2025</a:t>
             </a:fld>
             <a:endParaRPr lang="en-US"/>
           </a:p>
@@ -8130,7 +8130,7 @@
           <a:p>
             <a:fld id="{5958763E-B898-436D-883D-03711491D54A}" type="datetimeFigureOut">
               <a:rPr lang="en-US" smtClean="0"/>
-              <a:t>9/4/2024</a:t>
+              <a:t>2/26/2025</a:t>
             </a:fld>
             <a:endParaRPr lang="en-US"/>
           </a:p>
@@ -8234,7 +8234,7 @@
           <a:p>
             <a:fld id="{5958763E-B898-436D-883D-03711491D54A}" type="datetimeFigureOut">
               <a:rPr lang="en-US" smtClean="0"/>
-              <a:t>9/4/2024</a:t>
+              <a:t>2/26/2025</a:t>
             </a:fld>
             <a:endParaRPr lang="en-US"/>
           </a:p>
@@ -8561,7 +8561,7 @@
             <a:fld id="{1C2D31DE-C454-491C-B5C3-F097855E3DF7}" type="datetime4">
               <a:rPr lang="en-US" smtClean="0"/>
               <a:pPr/>
-              <a:t>September 4, 2024</a:t>
+              <a:t>February 26, 2025</a:t>
             </a:fld>
             <a:endParaRPr lang="en-US" dirty="0"/>
           </a:p>
@@ -11713,7 +11713,7 @@
           <a:p>
             <a:fld id="{5958763E-B898-436D-883D-03711491D54A}" type="datetimeFigureOut">
               <a:rPr lang="en-US" smtClean="0"/>
-              <a:t>9/4/2024</a:t>
+              <a:t>2/26/2025</a:t>
             </a:fld>
             <a:endParaRPr lang="en-US"/>
           </a:p>
@@ -11837,7 +11837,7 @@
           <a:p>
             <a:fld id="{5958763E-B898-436D-883D-03711491D54A}" type="datetimeFigureOut">
               <a:rPr lang="en-US" smtClean="0"/>
-              <a:t>9/4/2024</a:t>
+              <a:t>2/26/2025</a:t>
             </a:fld>
             <a:endParaRPr lang="en-US"/>
           </a:p>
@@ -11961,7 +11961,7 @@
           <a:p>
             <a:fld id="{5958763E-B898-436D-883D-03711491D54A}" type="datetimeFigureOut">
               <a:rPr lang="en-US" smtClean="0"/>
-              <a:t>9/4/2024</a:t>
+              <a:t>2/26/2025</a:t>
             </a:fld>
             <a:endParaRPr lang="en-US"/>
           </a:p>
@@ -12085,7 +12085,7 @@
           <a:p>
             <a:fld id="{5958763E-B898-436D-883D-03711491D54A}" type="datetimeFigureOut">
               <a:rPr lang="en-US" smtClean="0"/>
-              <a:t>9/4/2024</a:t>
+              <a:t>2/26/2025</a:t>
             </a:fld>
             <a:endParaRPr lang="en-US"/>
           </a:p>
@@ -12209,7 +12209,7 @@
           <a:p>
             <a:fld id="{5958763E-B898-436D-883D-03711491D54A}" type="datetimeFigureOut">
               <a:rPr lang="en-US" smtClean="0"/>
-              <a:t>9/4/2024</a:t>
+              <a:t>2/26/2025</a:t>
             </a:fld>
             <a:endParaRPr lang="en-US"/>
           </a:p>
@@ -12333,7 +12333,7 @@
           <a:p>
             <a:fld id="{5958763E-B898-436D-883D-03711491D54A}" type="datetimeFigureOut">
               <a:rPr lang="en-US" smtClean="0"/>
-              <a:t>9/4/2024</a:t>
+              <a:t>2/26/2025</a:t>
             </a:fld>
             <a:endParaRPr lang="en-US"/>
           </a:p>
@@ -12457,7 +12457,7 @@
           <a:p>
             <a:fld id="{5958763E-B898-436D-883D-03711491D54A}" type="datetimeFigureOut">
               <a:rPr lang="en-US" smtClean="0"/>
-              <a:t>9/4/2024</a:t>
+              <a:t>2/26/2025</a:t>
             </a:fld>
             <a:endParaRPr lang="en-US"/>
           </a:p>
@@ -12581,7 +12581,7 @@
           <a:p>
             <a:fld id="{5958763E-B898-436D-883D-03711491D54A}" type="datetimeFigureOut">
               <a:rPr lang="en-US" smtClean="0"/>
-              <a:t>9/4/2024</a:t>
+              <a:t>2/26/2025</a:t>
             </a:fld>
             <a:endParaRPr lang="en-US"/>
           </a:p>
@@ -12714,7 +12714,7 @@
           <a:p>
             <a:fld id="{5958763E-B898-436D-883D-03711491D54A}" type="datetimeFigureOut">
               <a:rPr lang="en-US" smtClean="0"/>
-              <a:t>9/4/2024</a:t>
+              <a:t>2/26/2025</a:t>
             </a:fld>
             <a:endParaRPr lang="en-US"/>
           </a:p>
@@ -16053,7 +16053,7 @@
             <a:fld id="{1C2D31DE-C454-491C-B5C3-F097855E3DF7}" type="datetime4">
               <a:rPr lang="en-US" smtClean="0"/>
               <a:pPr/>
-              <a:t>September 4, 2024</a:t>
+              <a:t>February 26, 2025</a:t>
             </a:fld>
             <a:endParaRPr lang="en-US" dirty="0"/>
           </a:p>
@@ -28289,7 +28289,7 @@
           <a:p>
             <a:fld id="{5958763E-B898-436D-883D-03711491D54A}" type="datetimeFigureOut">
               <a:rPr lang="en-US" smtClean="0"/>
-              <a:t>9/4/2024</a:t>
+              <a:t>2/26/2025</a:t>
             </a:fld>
             <a:endParaRPr lang="en-US"/>
           </a:p>
@@ -28691,7 +28691,7 @@
           <a:p>
             <a:fld id="{5958763E-B898-436D-883D-03711491D54A}" type="datetimeFigureOut">
               <a:rPr lang="en-US" smtClean="0"/>
-              <a:t>9/4/2024</a:t>
+              <a:t>2/26/2025</a:t>
             </a:fld>
             <a:endParaRPr lang="en-US"/>
           </a:p>
@@ -28985,7 +28985,7 @@
           <a:p>
             <a:fld id="{5958763E-B898-436D-883D-03711491D54A}" type="datetimeFigureOut">
               <a:rPr lang="en-US" smtClean="0"/>
-              <a:t>9/4/2024</a:t>
+              <a:t>2/26/2025</a:t>
             </a:fld>
             <a:endParaRPr lang="en-US"/>
           </a:p>
@@ -29186,7 +29186,7 @@
           <a:p>
             <a:fld id="{5958763E-B898-436D-883D-03711491D54A}" type="datetimeFigureOut">
               <a:rPr lang="en-US" smtClean="0"/>
-              <a:t>9/4/2024</a:t>
+              <a:t>2/26/2025</a:t>
             </a:fld>
             <a:endParaRPr lang="en-US"/>
           </a:p>
@@ -29447,7 +29447,7 @@
           <a:p>
             <a:fld id="{5958763E-B898-436D-883D-03711491D54A}" type="datetimeFigureOut">
               <a:rPr lang="en-US" smtClean="0"/>
-              <a:t>9/4/2024</a:t>
+              <a:t>2/26/2025</a:t>
             </a:fld>
             <a:endParaRPr lang="en-US"/>
           </a:p>
@@ -29955,7 +29955,7 @@
           <a:p>
             <a:fld id="{5958763E-B898-436D-883D-03711491D54A}" type="datetimeFigureOut">
               <a:rPr lang="en-US" smtClean="0"/>
-              <a:t>9/4/2024</a:t>
+              <a:t>2/26/2025</a:t>
             </a:fld>
             <a:endParaRPr lang="en-US"/>
           </a:p>
@@ -30434,7 +30434,7 @@
           <a:p>
             <a:fld id="{5958763E-B898-436D-883D-03711491D54A}" type="datetimeFigureOut">
               <a:rPr lang="en-US" smtClean="0"/>
-              <a:t>9/4/2024</a:t>
+              <a:t>2/26/2025</a:t>
             </a:fld>
             <a:endParaRPr lang="en-US"/>
           </a:p>
@@ -31253,7 +31253,7 @@
           <a:p>
             <a:fld id="{5958763E-B898-436D-883D-03711491D54A}" type="datetimeFigureOut">
               <a:rPr lang="en-US" smtClean="0"/>
-              <a:t>9/4/2024</a:t>
+              <a:t>2/26/2025</a:t>
             </a:fld>
             <a:endParaRPr lang="en-US"/>
           </a:p>
@@ -31454,7 +31454,7 @@
           <a:p>
             <a:fld id="{5958763E-B898-436D-883D-03711491D54A}" type="datetimeFigureOut">
               <a:rPr lang="en-US" smtClean="0"/>
-              <a:t>9/4/2024</a:t>
+              <a:t>2/26/2025</a:t>
             </a:fld>
             <a:endParaRPr lang="en-US"/>
           </a:p>
@@ -31789,7 +31789,7 @@
           <a:p>
             <a:fld id="{5958763E-B898-436D-883D-03711491D54A}" type="datetimeFigureOut">
               <a:rPr lang="en-US" smtClean="0"/>
-              <a:t>9/4/2024</a:t>
+              <a:t>2/26/2025</a:t>
             </a:fld>
             <a:endParaRPr lang="en-US"/>
           </a:p>
@@ -32019,7 +32019,7 @@
           <a:p>
             <a:fld id="{5958763E-B898-436D-883D-03711491D54A}" type="datetimeFigureOut">
               <a:rPr lang="en-US" smtClean="0"/>
-              <a:t>9/4/2024</a:t>
+              <a:t>2/26/2025</a:t>
             </a:fld>
             <a:endParaRPr lang="en-US"/>
           </a:p>
@@ -32263,7 +32263,7 @@
           <a:p>
             <a:fld id="{5958763E-B898-436D-883D-03711491D54A}" type="datetimeFigureOut">
               <a:rPr lang="en-US" smtClean="0"/>
-              <a:t>9/4/2024</a:t>
+              <a:t>2/26/2025</a:t>
             </a:fld>
             <a:endParaRPr lang="en-US"/>
           </a:p>
@@ -39438,7 +39438,7 @@
         <p:spPr>
           <a:xfrm>
             <a:off x="381000" y="1143000"/>
-            <a:ext cx="11430000" cy="3886200"/>
+            <a:ext cx="11430000" cy="1714500"/>
           </a:xfrm>
         </p:spPr>
         <p:txBody>
@@ -39456,14 +39456,14 @@
               <a:t>Go to </a:t>
             </a:r>
             <a:r>
-              <a:rPr lang="en-US" sz="3200" b="1" u="sng" dirty="0">
+              <a:rPr lang="en-US" sz="5400" b="1" dirty="0">
                 <a:solidFill>
                   <a:schemeClr val="accent1">
                     <a:lumMod val="75000"/>
                   </a:schemeClr>
                 </a:solidFill>
               </a:rPr>
-              <a:t>hylandtechclub.com/web-102</a:t>
+              <a:t>jsfiddle.net</a:t>
             </a:r>
           </a:p>
           <a:p>
@@ -39473,37 +39473,49 @@
             </a:pPr>
             <a:r>
               <a:rPr lang="en-US" sz="3200" dirty="0"/>
-              <a:t>Open the </a:t>
+              <a:t>Click into the </a:t>
             </a:r>
             <a:r>
               <a:rPr lang="en-US" sz="3200" b="1" dirty="0"/>
-              <a:t>JavaScript Starter project</a:t>
-            </a:r>
-          </a:p>
-          <a:p>
-            <a:pPr marL="800100" indent="-742950">
-              <a:buFont typeface="+mj-lt"/>
-              <a:buAutoNum type="arabicPeriod"/>
-            </a:pPr>
-            <a:r>
-              <a:rPr lang="en-US" sz="3200"/>
-              <a:t>Open </a:t>
+              <a:t>JavaScript</a:t>
             </a:r>
             <a:r>
               <a:rPr lang="en-US" sz="3200" dirty="0"/>
-              <a:t>the </a:t>
-            </a:r>
-            <a:r>
-              <a:rPr lang="en-US" sz="3200" b="1" dirty="0"/>
-              <a:t>script.js</a:t>
-            </a:r>
-            <a:r>
-              <a:rPr lang="en-US" sz="3200" dirty="0"/>
-              <a:t> file</a:t>
+              <a:t> section (bottom left)</a:t>
             </a:r>
           </a:p>
         </p:txBody>
       </p:sp>
+      <p:pic>
+        <p:nvPicPr>
+          <p:cNvPr id="5" name="Picture 4">
+            <a:extLst>
+              <a:ext uri="{FF2B5EF4-FFF2-40B4-BE49-F238E27FC236}">
+                <a16:creationId xmlns:a16="http://schemas.microsoft.com/office/drawing/2014/main" id="{0E80C3F2-339F-6F55-1458-488B769478D5}"/>
+              </a:ext>
+            </a:extLst>
+          </p:cNvPr>
+          <p:cNvPicPr>
+            <a:picLocks noChangeAspect="1"/>
+          </p:cNvPicPr>
+          <p:nvPr/>
+        </p:nvPicPr>
+        <p:blipFill>
+          <a:blip r:embed="rId2"/>
+          <a:stretch>
+            <a:fillRect/>
+          </a:stretch>
+        </p:blipFill>
+        <p:spPr>
+          <a:xfrm>
+            <a:off x="0" y="2459022"/>
+            <a:ext cx="12192000" cy="4437506"/>
+          </a:xfrm>
+          <a:prstGeom prst="rect">
+            <a:avLst/>
+          </a:prstGeom>
+        </p:spPr>
+      </p:pic>
     </p:spTree>
     <p:extLst>
       <p:ext uri="{BB962C8B-B14F-4D97-AF65-F5344CB8AC3E}">
@@ -39633,67 +39645,6 @@
                                           <p:spTgt spid="3">
                                             <p:txEl>
                                               <p:pRg st="1" end="1"/>
-                                            </p:txEl>
-                                          </p:spTgt>
-                                        </p:tgtEl>
-                                      </p:cBhvr>
-                                    </p:animEffect>
-                                  </p:childTnLst>
-                                </p:cTn>
-                              </p:par>
-                            </p:childTnLst>
-                          </p:cTn>
-                        </p:par>
-                      </p:childTnLst>
-                    </p:cTn>
-                  </p:par>
-                  <p:par>
-                    <p:cTn id="13" fill="hold">
-                      <p:stCondLst>
-                        <p:cond delay="indefinite"/>
-                      </p:stCondLst>
-                      <p:childTnLst>
-                        <p:par>
-                          <p:cTn id="14" fill="hold">
-                            <p:stCondLst>
-                              <p:cond delay="0"/>
-                            </p:stCondLst>
-                            <p:childTnLst>
-                              <p:par>
-                                <p:cTn id="15" presetID="10" presetClass="entr" presetSubtype="0" fill="hold" nodeType="clickEffect">
-                                  <p:stCondLst>
-                                    <p:cond delay="0"/>
-                                  </p:stCondLst>
-                                  <p:childTnLst>
-                                    <p:set>
-                                      <p:cBhvr>
-                                        <p:cTn id="16" dur="1" fill="hold">
-                                          <p:stCondLst>
-                                            <p:cond delay="0"/>
-                                          </p:stCondLst>
-                                        </p:cTn>
-                                        <p:tgtEl>
-                                          <p:spTgt spid="3">
-                                            <p:txEl>
-                                              <p:pRg st="2" end="2"/>
-                                            </p:txEl>
-                                          </p:spTgt>
-                                        </p:tgtEl>
-                                        <p:attrNameLst>
-                                          <p:attrName>style.visibility</p:attrName>
-                                        </p:attrNameLst>
-                                      </p:cBhvr>
-                                      <p:to>
-                                        <p:strVal val="visible"/>
-                                      </p:to>
-                                    </p:set>
-                                    <p:animEffect transition="in" filter="fade">
-                                      <p:cBhvr>
-                                        <p:cTn id="17" dur="500"/>
-                                        <p:tgtEl>
-                                          <p:spTgt spid="3">
-                                            <p:txEl>
-                                              <p:pRg st="2" end="2"/>
                                             </p:txEl>
                                           </p:spTgt>
                                         </p:tgtEl>

</xml_diff>